<commit_message>
Revised run.py with updated model
</commit_message>
<xml_diff>
--- a/4. Predicting the steering angle of a car/Slides/4.1.pptx
+++ b/4. Predicting the steering angle of a car/Slides/4.1.pptx
@@ -5,7 +5,7 @@
     <p:sldMasterId id="2147483669" r:id="rId1"/>
   </p:sldMasterIdLst>
   <p:notesMasterIdLst>
-    <p:notesMasterId r:id="rId25"/>
+    <p:notesMasterId r:id="rId26"/>
   </p:notesMasterIdLst>
   <p:sldIdLst>
     <p:sldId id="291" r:id="rId2"/>
@@ -30,31 +30,32 @@
     <p:sldId id="313" r:id="rId21"/>
     <p:sldId id="307" r:id="rId22"/>
     <p:sldId id="303" r:id="rId23"/>
-    <p:sldId id="301" r:id="rId24"/>
+    <p:sldId id="317" r:id="rId24"/>
+    <p:sldId id="301" r:id="rId25"/>
   </p:sldIdLst>
   <p:sldSz cx="18288000" cy="10282238"/>
   <p:notesSz cx="6858000" cy="9144000"/>
   <p:embeddedFontLst>
     <p:embeddedFont>
       <p:font typeface="Calibri" panose="020F0502020204030204" pitchFamily="34" charset="0"/>
-      <p:regular r:id="rId26"/>
-      <p:bold r:id="rId27"/>
-      <p:italic r:id="rId28"/>
-      <p:boldItalic r:id="rId29"/>
+      <p:regular r:id="rId27"/>
+      <p:bold r:id="rId28"/>
+      <p:italic r:id="rId29"/>
+      <p:boldItalic r:id="rId30"/>
     </p:embeddedFont>
     <p:embeddedFont>
       <p:font typeface="Consolas" panose="020B0609020204030204" pitchFamily="49" charset="0"/>
-      <p:regular r:id="rId30"/>
-      <p:bold r:id="rId31"/>
-      <p:italic r:id="rId32"/>
-      <p:boldItalic r:id="rId33"/>
+      <p:regular r:id="rId31"/>
+      <p:bold r:id="rId32"/>
+      <p:italic r:id="rId33"/>
+      <p:boldItalic r:id="rId34"/>
     </p:embeddedFont>
     <p:embeddedFont>
       <p:font typeface="Roboto" panose="02000000000000000000" pitchFamily="2" charset="0"/>
-      <p:regular r:id="rId34"/>
-      <p:bold r:id="rId35"/>
-      <p:italic r:id="rId36"/>
-      <p:boldItalic r:id="rId37"/>
+      <p:regular r:id="rId35"/>
+      <p:bold r:id="rId36"/>
+      <p:italic r:id="rId37"/>
+      <p:boldItalic r:id="rId38"/>
     </p:embeddedFont>
   </p:embeddedFontLst>
   <p:defaultTextStyle>
@@ -2213,6 +2214,138 @@
 </file>
 
 <file path=ppt/notesSlides/notesSlide21.xml><?xml version="1.0" encoding="utf-8"?>
+<p:notes xmlns:a="http://schemas.openxmlformats.org/drawingml/2006/main" xmlns:r="http://schemas.openxmlformats.org/officeDocument/2006/relationships" xmlns:p="http://schemas.openxmlformats.org/presentationml/2006/main" showMasterSp="0" showMasterPhAnim="0">
+  <p:cSld>
+    <p:spTree>
+      <p:nvGrpSpPr>
+        <p:cNvPr id="1" name="Shape 144"/>
+        <p:cNvGrpSpPr/>
+        <p:nvPr/>
+      </p:nvGrpSpPr>
+      <p:grpSpPr>
+        <a:xfrm>
+          <a:off x="0" y="0"/>
+          <a:ext cx="0" cy="0"/>
+          <a:chOff x="0" y="0"/>
+          <a:chExt cx="0" cy="0"/>
+        </a:xfrm>
+      </p:grpSpPr>
+      <p:sp>
+        <p:nvSpPr>
+          <p:cNvPr id="145" name="Shape 145"/>
+          <p:cNvSpPr>
+            <a:spLocks noGrp="1" noRot="1" noChangeAspect="1"/>
+          </p:cNvSpPr>
+          <p:nvPr>
+            <p:ph type="sldImg" idx="2"/>
+          </p:nvPr>
+        </p:nvSpPr>
+        <p:spPr>
+          <a:xfrm>
+            <a:off x="381000" y="685800"/>
+            <a:ext cx="6096000" cy="3429000"/>
+          </a:xfrm>
+          <a:custGeom>
+            <a:avLst/>
+            <a:gdLst/>
+            <a:ahLst/>
+            <a:cxnLst/>
+            <a:rect l="0" t="0" r="0" b="0"/>
+            <a:pathLst>
+              <a:path w="120000" h="120000" extrusionOk="0">
+                <a:moveTo>
+                  <a:pt x="0" y="0"/>
+                </a:moveTo>
+                <a:lnTo>
+                  <a:pt x="120000" y="0"/>
+                </a:lnTo>
+                <a:lnTo>
+                  <a:pt x="120000" y="120000"/>
+                </a:lnTo>
+                <a:lnTo>
+                  <a:pt x="0" y="120000"/>
+                </a:lnTo>
+                <a:close/>
+              </a:path>
+            </a:pathLst>
+          </a:custGeom>
+        </p:spPr>
+      </p:sp>
+      <p:sp>
+        <p:nvSpPr>
+          <p:cNvPr id="146" name="Shape 146"/>
+          <p:cNvSpPr txBox="1">
+            <a:spLocks noGrp="1"/>
+          </p:cNvSpPr>
+          <p:nvPr>
+            <p:ph type="body" idx="1"/>
+          </p:nvPr>
+        </p:nvSpPr>
+        <p:spPr>
+          <a:xfrm>
+            <a:off x="685800" y="4343400"/>
+            <a:ext cx="5486400" cy="4114800"/>
+          </a:xfrm>
+          <a:prstGeom prst="rect">
+            <a:avLst/>
+          </a:prstGeom>
+        </p:spPr>
+        <p:txBody>
+          <a:bodyPr lIns="91425" tIns="91425" rIns="91425" bIns="91425" anchor="t" anchorCtr="0">
+            <a:noAutofit/>
+          </a:bodyPr>
+          <a:lstStyle/>
+          <a:p>
+            <a:pPr lvl="0" rtl="0">
+              <a:spcBef>
+                <a:spcPts val="0"/>
+              </a:spcBef>
+              <a:buNone/>
+            </a:pPr>
+            <a:r>
+              <a:rPr lang="en-US" dirty="0"/>
+              <a:t>This slide, like mentioned above is for multiple pointers. The information above covers the types</a:t>
+            </a:r>
+            <a:r>
+              <a:rPr lang="en-US" baseline="0" dirty="0"/>
+              <a:t> of information that can be used in this slide</a:t>
+            </a:r>
+            <a:endParaRPr lang="en-US" dirty="0"/>
+          </a:p>
+          <a:p>
+            <a:pPr lvl="0" rtl="0">
+              <a:spcBef>
+                <a:spcPts val="0"/>
+              </a:spcBef>
+              <a:buNone/>
+            </a:pPr>
+            <a:endParaRPr lang="en-US" dirty="0"/>
+          </a:p>
+          <a:p>
+            <a:pPr lvl="0">
+              <a:spcBef>
+                <a:spcPts val="0"/>
+              </a:spcBef>
+              <a:buNone/>
+            </a:pPr>
+            <a:endParaRPr dirty="0"/>
+          </a:p>
+        </p:txBody>
+      </p:sp>
+    </p:spTree>
+    <p:extLst>
+      <p:ext uri="{BB962C8B-B14F-4D97-AF65-F5344CB8AC3E}">
+        <p14:creationId xmlns:p14="http://schemas.microsoft.com/office/powerpoint/2010/main" val="3974685710"/>
+      </p:ext>
+    </p:extLst>
+  </p:cSld>
+  <p:clrMapOvr>
+    <a:masterClrMapping/>
+  </p:clrMapOvr>
+</p:notes>
+</file>
+
+<file path=ppt/notesSlides/notesSlide22.xml><?xml version="1.0" encoding="utf-8"?>
 <p:notes xmlns:a="http://schemas.openxmlformats.org/drawingml/2006/main" xmlns:r="http://schemas.openxmlformats.org/officeDocument/2006/relationships" xmlns:p="http://schemas.openxmlformats.org/presentationml/2006/main" showMasterSp="0" showMasterPhAnim="0">
   <p:cSld>
     <p:spTree>
@@ -7785,6 +7918,40 @@
               <a:buFont typeface="Calibri"/>
               <a:buChar char="●"/>
             </a:pPr>
+            <a:r>
+              <a:rPr lang="en-US" sz="2400" dirty="0">
+                <a:solidFill>
+                  <a:srgbClr val="434343"/>
+                </a:solidFill>
+              </a:rPr>
+              <a:t>See </a:t>
+            </a:r>
+            <a:r>
+              <a:rPr lang="en-US" sz="2400" dirty="0">
+                <a:solidFill>
+                  <a:srgbClr val="434343"/>
+                </a:solidFill>
+                <a:hlinkClick r:id="rId3"/>
+              </a:rPr>
+              <a:t>https://keras.io/getting-started/faq/#why-is-the-training-loss-much-higher-than-the-testing-loss</a:t>
+            </a:r>
+            <a:r>
+              <a:rPr lang="en-US" sz="2400" dirty="0">
+                <a:solidFill>
+                  <a:srgbClr val="434343"/>
+                </a:solidFill>
+              </a:rPr>
+              <a:t> </a:t>
+            </a:r>
+          </a:p>
+          <a:p>
+            <a:pPr marL="914507" indent="-711281">
+              <a:buClr>
+                <a:srgbClr val="434343"/>
+              </a:buClr>
+              <a:buFont typeface="Calibri"/>
+              <a:buChar char="●"/>
+            </a:pPr>
             <a:endParaRPr lang="en-US" sz="4002" dirty="0">
               <a:solidFill>
                 <a:srgbClr val="434343"/>
@@ -8027,6 +8194,34 @@
               </a:rPr>
               <a:t>We are looking for the [training] loss and validation loss to decrease over time</a:t>
             </a:r>
+          </a:p>
+          <a:p>
+            <a:pPr marL="914507" indent="-711281">
+              <a:buClr>
+                <a:srgbClr val="434343"/>
+              </a:buClr>
+              <a:buFont typeface="Calibri"/>
+              <a:buChar char="●"/>
+            </a:pPr>
+            <a:endParaRPr lang="en-US" sz="4002" dirty="0">
+              <a:solidFill>
+                <a:srgbClr val="434343"/>
+              </a:solidFill>
+            </a:endParaRPr>
+          </a:p>
+          <a:p>
+            <a:pPr marL="914507" indent="-711281">
+              <a:buClr>
+                <a:srgbClr val="434343"/>
+              </a:buClr>
+              <a:buFont typeface="Calibri"/>
+              <a:buChar char="●"/>
+            </a:pPr>
+            <a:endParaRPr lang="en-US" sz="4002" dirty="0">
+              <a:solidFill>
+                <a:srgbClr val="434343"/>
+              </a:solidFill>
+            </a:endParaRPr>
           </a:p>
           <a:p>
             <a:pPr marL="914507" indent="-711281">
@@ -8331,7 +8526,6 @@
               <a:buClr>
                 <a:srgbClr val="434343"/>
               </a:buClr>
-              <a:buFont typeface="Calibri"/>
               <a:buChar char="●"/>
             </a:pPr>
             <a:r>
@@ -8340,23 +8534,23 @@
                   <a:srgbClr val="434343"/>
                 </a:solidFill>
               </a:rPr>
-              <a:t>Display what the CNN “sees”??</a:t>
-            </a:r>
-          </a:p>
-          <a:p>
-            <a:pPr marL="914507" indent="-711281">
-              <a:buClr>
-                <a:srgbClr val="434343"/>
-              </a:buClr>
-              <a:buChar char="●"/>
-            </a:pPr>
+              <a:t>Creating </a:t>
+            </a:r>
+            <a:r>
+              <a:rPr lang="en-US" sz="4002">
+                <a:solidFill>
+                  <a:srgbClr val="434343"/>
+                </a:solidFill>
+              </a:rPr>
+              <a:t>a video </a:t>
+            </a:r>
             <a:r>
               <a:rPr lang="en-US" sz="4002" dirty="0">
                 <a:solidFill>
                   <a:srgbClr val="434343"/>
                 </a:solidFill>
               </a:rPr>
-              <a:t>Creating a YouTube video of this in action</a:t>
+              <a:t>of this in action</a:t>
             </a:r>
           </a:p>
           <a:p>
@@ -8424,6 +8618,225 @@
 </file>
 
 <file path=ppt/slides/slide23.xml><?xml version="1.0" encoding="utf-8"?>
+<p:sld xmlns:a="http://schemas.openxmlformats.org/drawingml/2006/main" xmlns:r="http://schemas.openxmlformats.org/officeDocument/2006/relationships" xmlns:p="http://schemas.openxmlformats.org/presentationml/2006/main">
+  <p:cSld>
+    <p:spTree>
+      <p:nvGrpSpPr>
+        <p:cNvPr id="1" name="Shape 147"/>
+        <p:cNvGrpSpPr/>
+        <p:nvPr/>
+      </p:nvGrpSpPr>
+      <p:grpSpPr>
+        <a:xfrm>
+          <a:off x="0" y="0"/>
+          <a:ext cx="0" cy="0"/>
+          <a:chOff x="0" y="0"/>
+          <a:chExt cx="0" cy="0"/>
+        </a:xfrm>
+      </p:grpSpPr>
+      <p:sp>
+        <p:nvSpPr>
+          <p:cNvPr id="148" name="Shape 148"/>
+          <p:cNvSpPr txBox="1">
+            <a:spLocks noGrp="1"/>
+          </p:cNvSpPr>
+          <p:nvPr>
+            <p:ph type="title"/>
+          </p:nvPr>
+        </p:nvSpPr>
+        <p:spPr>
+          <a:xfrm>
+            <a:off x="192358" y="32689"/>
+            <a:ext cx="17661379" cy="1204842"/>
+          </a:xfrm>
+          <a:prstGeom prst="rect">
+            <a:avLst/>
+          </a:prstGeom>
+        </p:spPr>
+        <p:txBody>
+          <a:bodyPr lIns="182874" tIns="182874" rIns="182874" bIns="182874" anchor="ctr" anchorCtr="0">
+            <a:noAutofit/>
+          </a:bodyPr>
+          <a:lstStyle/>
+          <a:p>
+            <a:pPr algn="ctr"/>
+            <a:r>
+              <a:rPr lang="en" sz="4402" dirty="0"/>
+              <a:t>How to make it better?</a:t>
+            </a:r>
+          </a:p>
+        </p:txBody>
+      </p:sp>
+      <p:sp>
+        <p:nvSpPr>
+          <p:cNvPr id="149" name="Shape 149"/>
+          <p:cNvSpPr txBox="1">
+            <a:spLocks noGrp="1"/>
+          </p:cNvSpPr>
+          <p:nvPr>
+            <p:ph type="body" idx="4294967295"/>
+          </p:nvPr>
+        </p:nvSpPr>
+        <p:spPr>
+          <a:xfrm>
+            <a:off x="413459" y="1776131"/>
+            <a:ext cx="17440478" cy="8042873"/>
+          </a:xfrm>
+          <a:prstGeom prst="rect">
+            <a:avLst/>
+          </a:prstGeom>
+        </p:spPr>
+        <p:txBody>
+          <a:bodyPr lIns="182874" tIns="182874" rIns="182874" bIns="182874" anchor="t" anchorCtr="0">
+            <a:noAutofit/>
+          </a:bodyPr>
+          <a:lstStyle/>
+          <a:p>
+            <a:pPr marL="914507" indent="-711281">
+              <a:buClr>
+                <a:srgbClr val="434343"/>
+              </a:buClr>
+              <a:buChar char="●"/>
+            </a:pPr>
+            <a:r>
+              <a:rPr lang="en-US" sz="4002" dirty="0">
+                <a:solidFill>
+                  <a:srgbClr val="434343"/>
+                </a:solidFill>
+              </a:rPr>
+              <a:t>Testing model accuracy</a:t>
+            </a:r>
+          </a:p>
+          <a:p>
+            <a:pPr marL="914507" indent="-711281">
+              <a:buClr>
+                <a:srgbClr val="434343"/>
+              </a:buClr>
+              <a:buChar char="●"/>
+            </a:pPr>
+            <a:r>
+              <a:rPr lang="en-US" sz="4002" dirty="0">
+                <a:solidFill>
+                  <a:srgbClr val="434343"/>
+                </a:solidFill>
+              </a:rPr>
+              <a:t>Displaying the steering wheel</a:t>
+            </a:r>
+          </a:p>
+          <a:p>
+            <a:pPr marL="914507" indent="-711281">
+              <a:buClr>
+                <a:srgbClr val="434343"/>
+              </a:buClr>
+              <a:buChar char="●"/>
+            </a:pPr>
+            <a:r>
+              <a:rPr lang="en-US" sz="4002" dirty="0">
+                <a:solidFill>
+                  <a:srgbClr val="434343"/>
+                </a:solidFill>
+              </a:rPr>
+              <a:t>Smoothing out the movement</a:t>
+            </a:r>
+          </a:p>
+          <a:p>
+            <a:pPr marL="914507" indent="-711281">
+              <a:buClr>
+                <a:srgbClr val="434343"/>
+              </a:buClr>
+              <a:buFont typeface="Calibri"/>
+              <a:buChar char="●"/>
+            </a:pPr>
+            <a:r>
+              <a:rPr lang="en-US" sz="4002" dirty="0">
+                <a:solidFill>
+                  <a:srgbClr val="434343"/>
+                </a:solidFill>
+              </a:rPr>
+              <a:t>Display what the CNN “sees”??</a:t>
+            </a:r>
+          </a:p>
+          <a:p>
+            <a:pPr marL="914507" indent="-711281">
+              <a:buClr>
+                <a:srgbClr val="434343"/>
+              </a:buClr>
+              <a:buChar char="●"/>
+            </a:pPr>
+            <a:r>
+              <a:rPr lang="en-US" sz="4002" dirty="0">
+                <a:solidFill>
+                  <a:srgbClr val="434343"/>
+                </a:solidFill>
+              </a:rPr>
+              <a:t>Creating a YouTube video of this in action</a:t>
+            </a:r>
+          </a:p>
+          <a:p>
+            <a:pPr marL="914507" indent="-711281">
+              <a:buClr>
+                <a:srgbClr val="434343"/>
+              </a:buClr>
+              <a:buChar char="●"/>
+            </a:pPr>
+            <a:endParaRPr lang="en-US" sz="4002" dirty="0">
+              <a:solidFill>
+                <a:srgbClr val="434343"/>
+              </a:solidFill>
+            </a:endParaRPr>
+          </a:p>
+          <a:p>
+            <a:pPr marL="203226" lvl="1">
+              <a:buClr>
+                <a:srgbClr val="434343"/>
+              </a:buClr>
+            </a:pPr>
+            <a:r>
+              <a:rPr lang="en-GB" sz="3200" dirty="0">
+                <a:solidFill>
+                  <a:srgbClr val="434343"/>
+                </a:solidFill>
+                <a:latin typeface="Consolas" panose="020B0609020204030204" pitchFamily="49" charset="0"/>
+                <a:cs typeface="Consolas" panose="020B0609020204030204" pitchFamily="49" charset="0"/>
+              </a:rPr>
+              <a:t>		</a:t>
+            </a:r>
+            <a:endParaRPr lang="en-US" sz="4002" dirty="0">
+              <a:solidFill>
+                <a:srgbClr val="434343"/>
+              </a:solidFill>
+            </a:endParaRPr>
+          </a:p>
+          <a:p>
+            <a:pPr marL="774726" indent="-571500">
+              <a:buClr>
+                <a:srgbClr val="434343"/>
+              </a:buClr>
+              <a:buFont typeface="Arial" panose="020B0604020202020204" pitchFamily="34" charset="0"/>
+              <a:buChar char="•"/>
+            </a:pPr>
+            <a:endParaRPr lang="en" sz="4002" dirty="0">
+              <a:solidFill>
+                <a:srgbClr val="434343"/>
+              </a:solidFill>
+            </a:endParaRPr>
+          </a:p>
+        </p:txBody>
+      </p:sp>
+    </p:spTree>
+    <p:extLst>
+      <p:ext uri="{BB962C8B-B14F-4D97-AF65-F5344CB8AC3E}">
+        <p14:creationId xmlns:p14="http://schemas.microsoft.com/office/powerpoint/2010/main" val="2612864631"/>
+      </p:ext>
+    </p:extLst>
+  </p:cSld>
+  <p:clrMapOvr>
+    <a:masterClrMapping/>
+  </p:clrMapOvr>
+</p:sld>
+</file>
+
+<file path=ppt/slides/slide24.xml><?xml version="1.0" encoding="utf-8"?>
 <p:sld xmlns:a="http://schemas.openxmlformats.org/drawingml/2006/main" xmlns:r="http://schemas.openxmlformats.org/officeDocument/2006/relationships" xmlns:p="http://schemas.openxmlformats.org/presentationml/2006/main">
   <p:cSld>
     <p:bg>

</xml_diff>

<commit_message>
Refining section 4 slides
</commit_message>
<xml_diff>
--- a/4. Predicting the steering angle of a car/Slides/4.1.pptx
+++ b/4. Predicting the steering angle of a car/Slides/4.1.pptx
@@ -5,7 +5,7 @@
     <p:sldMasterId id="2147483669" r:id="rId1"/>
   </p:sldMasterIdLst>
   <p:notesMasterIdLst>
-    <p:notesMasterId r:id="rId26"/>
+    <p:notesMasterId r:id="rId28"/>
   </p:notesMasterIdLst>
   <p:sldIdLst>
     <p:sldId id="291" r:id="rId2"/>
@@ -26,36 +26,38 @@
     <p:sldId id="309" r:id="rId17"/>
     <p:sldId id="311" r:id="rId18"/>
     <p:sldId id="310" r:id="rId19"/>
-    <p:sldId id="312" r:id="rId20"/>
-    <p:sldId id="313" r:id="rId21"/>
-    <p:sldId id="307" r:id="rId22"/>
-    <p:sldId id="303" r:id="rId23"/>
-    <p:sldId id="317" r:id="rId24"/>
-    <p:sldId id="301" r:id="rId25"/>
+    <p:sldId id="318" r:id="rId20"/>
+    <p:sldId id="312" r:id="rId21"/>
+    <p:sldId id="313" r:id="rId22"/>
+    <p:sldId id="307" r:id="rId23"/>
+    <p:sldId id="303" r:id="rId24"/>
+    <p:sldId id="319" r:id="rId25"/>
+    <p:sldId id="317" r:id="rId26"/>
+    <p:sldId id="301" r:id="rId27"/>
   </p:sldIdLst>
   <p:sldSz cx="18288000" cy="10282238"/>
   <p:notesSz cx="6858000" cy="9144000"/>
   <p:embeddedFontLst>
     <p:embeddedFont>
       <p:font typeface="Calibri" panose="020F0502020204030204" pitchFamily="34" charset="0"/>
-      <p:regular r:id="rId27"/>
-      <p:bold r:id="rId28"/>
-      <p:italic r:id="rId29"/>
-      <p:boldItalic r:id="rId30"/>
+      <p:regular r:id="rId29"/>
+      <p:bold r:id="rId30"/>
+      <p:italic r:id="rId31"/>
+      <p:boldItalic r:id="rId32"/>
     </p:embeddedFont>
     <p:embeddedFont>
       <p:font typeface="Consolas" panose="020B0609020204030204" pitchFamily="49" charset="0"/>
-      <p:regular r:id="rId31"/>
-      <p:bold r:id="rId32"/>
-      <p:italic r:id="rId33"/>
-      <p:boldItalic r:id="rId34"/>
+      <p:regular r:id="rId33"/>
+      <p:bold r:id="rId34"/>
+      <p:italic r:id="rId35"/>
+      <p:boldItalic r:id="rId36"/>
     </p:embeddedFont>
     <p:embeddedFont>
       <p:font typeface="Roboto" panose="02000000000000000000" pitchFamily="2" charset="0"/>
-      <p:regular r:id="rId35"/>
-      <p:bold r:id="rId36"/>
-      <p:italic r:id="rId37"/>
-      <p:boldItalic r:id="rId38"/>
+      <p:regular r:id="rId37"/>
+      <p:bold r:id="rId38"/>
+      <p:italic r:id="rId39"/>
+      <p:boldItalic r:id="rId40"/>
     </p:embeddedFont>
   </p:embeddedFontLst>
   <p:defaultTextStyle>
@@ -279,6 +281,33 @@
 </p:presentation>
 </file>
 
+<file path=ppt/ink/ink1.xml><?xml version="1.0" encoding="utf-8"?>
+<inkml:ink xmlns:inkml="http://www.w3.org/2003/InkML">
+  <inkml:definitions>
+    <inkml:context xml:id="ctx0">
+      <inkml:inkSource xml:id="inkSrc0">
+        <inkml:traceFormat>
+          <inkml:channel name="X" type="integer" min="-2.14748E9" max="2.14748E9" units="cm"/>
+          <inkml:channel name="Y" type="integer" min="-2.14748E9" max="2.14748E9" units="cm"/>
+          <inkml:channel name="F" type="integer" max="32767" units="dev"/>
+        </inkml:traceFormat>
+        <inkml:channelProperties>
+          <inkml:channelProperty channel="X" name="resolution" value="1000" units="1/cm"/>
+          <inkml:channelProperty channel="Y" name="resolution" value="1000" units="1/cm"/>
+          <inkml:channelProperty channel="F" name="resolution" value="0" units="1/dev"/>
+        </inkml:channelProperties>
+      </inkml:inkSource>
+      <inkml:timestamp xml:id="ts0" timeString="2018-11-16T09:30:07.210"/>
+    </inkml:context>
+    <inkml:brush xml:id="br0">
+      <inkml:brushProperty name="width" value="0.05" units="cm"/>
+      <inkml:brushProperty name="height" value="0.05" units="cm"/>
+    </inkml:brush>
+  </inkml:definitions>
+  <inkml:trace contextRef="#ctx0" brushRef="#br0">13 13 24575,'-12'-13'0</inkml:trace>
+</inkml:ink>
+</file>
+
 <file path=ppt/notesMasters/notesMaster1.xml><?xml version="1.0" encoding="utf-8"?>
 <p:notesMaster xmlns:a="http://schemas.openxmlformats.org/drawingml/2006/main" xmlns:r="http://schemas.openxmlformats.org/officeDocument/2006/relationships" xmlns:p="http://schemas.openxmlformats.org/presentationml/2006/main">
   <p:cSld>
@@ -762,7 +791,19 @@
             </a:pPr>
             <a:r>
               <a:rPr lang="en-US" dirty="0"/>
-              <a:t>Took approx. 5 hours on a 2core 13GB VM in Google cloud using a Nvidia K80 GPIU</a:t>
+              <a:t>Took approx. 5 hours on a 2core 13GB VM in Google cloud using a Nvidia K80 GPU</a:t>
+            </a:r>
+          </a:p>
+          <a:p>
+            <a:pPr lvl="0" rtl="0">
+              <a:spcBef>
+                <a:spcPts val="0"/>
+              </a:spcBef>
+              <a:buNone/>
+            </a:pPr>
+            <a:r>
+              <a:rPr lang="en-US" dirty="0"/>
+              <a:t>However, I’ve provided a pre-trained model so you can still work with the code and understand what it is doing</a:t>
             </a:r>
           </a:p>
           <a:p>
@@ -1362,11 +1403,11 @@
 </file>
 
 <file path=ppt/notesSlides/notesSlide15.xml><?xml version="1.0" encoding="utf-8"?>
-<p:notes xmlns:a="http://schemas.openxmlformats.org/drawingml/2006/main" xmlns:r="http://schemas.openxmlformats.org/officeDocument/2006/relationships" xmlns:p="http://schemas.openxmlformats.org/presentationml/2006/main" showMasterSp="0" showMasterPhAnim="0">
+<p:notes xmlns:a="http://schemas.openxmlformats.org/drawingml/2006/main" xmlns:r="http://schemas.openxmlformats.org/officeDocument/2006/relationships" xmlns:p="http://schemas.openxmlformats.org/presentationml/2006/main">
   <p:cSld>
     <p:spTree>
       <p:nvGrpSpPr>
-        <p:cNvPr id="1" name="Shape 144"/>
+        <p:cNvPr id="1" name=""/>
         <p:cNvGrpSpPr/>
         <p:nvPr/>
       </p:nvGrpSpPr>
@@ -1380,110 +1421,63 @@
       </p:grpSpPr>
       <p:sp>
         <p:nvSpPr>
-          <p:cNvPr id="145" name="Shape 145"/>
+          <p:cNvPr id="2" name="Slide Image Placeholder 1"/>
           <p:cNvSpPr>
             <a:spLocks noGrp="1" noRot="1" noChangeAspect="1"/>
           </p:cNvSpPr>
           <p:nvPr>
-            <p:ph type="sldImg" idx="2"/>
+            <p:ph type="sldImg"/>
           </p:nvPr>
         </p:nvSpPr>
-        <p:spPr>
-          <a:xfrm>
-            <a:off x="381000" y="685800"/>
-            <a:ext cx="6096000" cy="3429000"/>
-          </a:xfrm>
-          <a:custGeom>
-            <a:avLst/>
-            <a:gdLst/>
-            <a:ahLst/>
-            <a:cxnLst/>
-            <a:rect l="0" t="0" r="0" b="0"/>
-            <a:pathLst>
-              <a:path w="120000" h="120000" extrusionOk="0">
-                <a:moveTo>
-                  <a:pt x="0" y="0"/>
-                </a:moveTo>
-                <a:lnTo>
-                  <a:pt x="120000" y="0"/>
-                </a:lnTo>
-                <a:lnTo>
-                  <a:pt x="120000" y="120000"/>
-                </a:lnTo>
-                <a:lnTo>
-                  <a:pt x="0" y="120000"/>
-                </a:lnTo>
-                <a:close/>
-              </a:path>
-            </a:pathLst>
-          </a:custGeom>
-        </p:spPr>
+        <p:spPr/>
       </p:sp>
       <p:sp>
         <p:nvSpPr>
-          <p:cNvPr id="146" name="Shape 146"/>
-          <p:cNvSpPr txBox="1">
+          <p:cNvPr id="3" name="Notes Placeholder 2"/>
+          <p:cNvSpPr>
             <a:spLocks noGrp="1"/>
           </p:cNvSpPr>
           <p:nvPr>
             <p:ph type="body" idx="1"/>
           </p:nvPr>
         </p:nvSpPr>
-        <p:spPr>
-          <a:xfrm>
-            <a:off x="685800" y="4343400"/>
-            <a:ext cx="5486400" cy="4114800"/>
-          </a:xfrm>
-          <a:prstGeom prst="rect">
-            <a:avLst/>
-          </a:prstGeom>
-        </p:spPr>
+        <p:spPr/>
         <p:txBody>
-          <a:bodyPr lIns="91425" tIns="91425" rIns="91425" bIns="91425" anchor="t" anchorCtr="0">
-            <a:noAutofit/>
-          </a:bodyPr>
+          <a:bodyPr/>
           <a:lstStyle/>
           <a:p>
-            <a:pPr lvl="0" rtl="0">
-              <a:spcBef>
-                <a:spcPts val="0"/>
-              </a:spcBef>
-              <a:buNone/>
-            </a:pPr>
             <a:r>
               <a:rPr lang="en-US" dirty="0"/>
-              <a:t>This slide, like mentioned above is for multiple pointers. The information above covers the types</a:t>
-            </a:r>
-            <a:r>
-              <a:rPr lang="en-US" baseline="0" dirty="0"/>
-              <a:t> of information that can be used in this slide</a:t>
-            </a:r>
+              <a:t>We split the data into training, validation and testing to help train the model and understand how it predicts previously unseen examples.</a:t>
+            </a:r>
+          </a:p>
+          <a:p>
+            <a:r>
+              <a:rPr lang="en-US" dirty="0"/>
+              <a:t>During a typical training exercise, training data is used to train the model, then validation data is used to understand how well it predicts after that epoch.  For example, if I train on 128 images, I would then validate how accurate the prediction was on another 128 samples.</a:t>
+            </a:r>
+          </a:p>
+          <a:p>
+            <a:r>
+              <a:rPr lang="en-US" dirty="0"/>
+              <a:t>Once the model is fully trained, you would test it on the final 20% to see how accurate it is.</a:t>
+            </a:r>
+          </a:p>
+          <a:p>
+            <a:r>
+              <a:rPr lang="en-US" dirty="0"/>
+              <a:t>This is one option of splitting the data, another way could be to take the first 60% as training data, the next 20% as validation, and the final 20% as test data.</a:t>
+            </a:r>
+          </a:p>
+          <a:p>
             <a:endParaRPr lang="en-US" dirty="0"/>
-          </a:p>
-          <a:p>
-            <a:pPr lvl="0" rtl="0">
-              <a:spcBef>
-                <a:spcPts val="0"/>
-              </a:spcBef>
-              <a:buNone/>
-            </a:pPr>
-            <a:endParaRPr lang="en-US" dirty="0"/>
-          </a:p>
-          <a:p>
-            <a:pPr lvl="0">
-              <a:spcBef>
-                <a:spcPts val="0"/>
-              </a:spcBef>
-              <a:buNone/>
-            </a:pPr>
-            <a:endParaRPr dirty="0"/>
           </a:p>
         </p:txBody>
       </p:sp>
     </p:spTree>
     <p:extLst>
       <p:ext uri="{BB962C8B-B14F-4D97-AF65-F5344CB8AC3E}">
-        <p14:creationId xmlns:p14="http://schemas.microsoft.com/office/powerpoint/2010/main" val="650117490"/>
+        <p14:creationId xmlns:p14="http://schemas.microsoft.com/office/powerpoint/2010/main" val="1774118689"/>
       </p:ext>
     </p:extLst>
   </p:cSld>
@@ -1615,7 +1609,7 @@
     </p:spTree>
     <p:extLst>
       <p:ext uri="{BB962C8B-B14F-4D97-AF65-F5344CB8AC3E}">
-        <p14:creationId xmlns:p14="http://schemas.microsoft.com/office/powerpoint/2010/main" val="2083510538"/>
+        <p14:creationId xmlns:p14="http://schemas.microsoft.com/office/powerpoint/2010/main" val="650117490"/>
       </p:ext>
     </p:extLst>
   </p:cSld>
@@ -1716,12 +1710,16 @@
             </a:pPr>
             <a:r>
               <a:rPr lang="en-US" dirty="0"/>
-              <a:t>This slide, like mentioned above is for multiple pointers. The information above covers the types</a:t>
-            </a:r>
-            <a:r>
-              <a:rPr lang="en-US" baseline="0" dirty="0"/>
-              <a:t> of information that can be used in this slide</a:t>
-            </a:r>
+              <a:t>Our CNN is built up of a 5 convolutional layers followed by 3 fully connected layers.  Dropout is used to improve training performance by effectively dropping connections between artificial neurons.  It makes those that remain more resilient to the underlying data.</a:t>
+            </a:r>
+          </a:p>
+          <a:p>
+            <a:pPr lvl="0" rtl="0">
+              <a:spcBef>
+                <a:spcPts val="0"/>
+              </a:spcBef>
+              <a:buNone/>
+            </a:pPr>
             <a:endParaRPr lang="en-US" dirty="0"/>
           </a:p>
           <a:p>
@@ -1747,7 +1745,7 @@
     </p:spTree>
     <p:extLst>
       <p:ext uri="{BB962C8B-B14F-4D97-AF65-F5344CB8AC3E}">
-        <p14:creationId xmlns:p14="http://schemas.microsoft.com/office/powerpoint/2010/main" val="3163693538"/>
+        <p14:creationId xmlns:p14="http://schemas.microsoft.com/office/powerpoint/2010/main" val="2083510538"/>
       </p:ext>
     </p:extLst>
   </p:cSld>
@@ -1758,6 +1756,153 @@
 </file>
 
 <file path=ppt/notesSlides/notesSlide18.xml><?xml version="1.0" encoding="utf-8"?>
+<p:notes xmlns:a="http://schemas.openxmlformats.org/drawingml/2006/main" xmlns:r="http://schemas.openxmlformats.org/officeDocument/2006/relationships" xmlns:p="http://schemas.openxmlformats.org/presentationml/2006/main" showMasterSp="0" showMasterPhAnim="0">
+  <p:cSld>
+    <p:spTree>
+      <p:nvGrpSpPr>
+        <p:cNvPr id="1" name="Shape 169"/>
+        <p:cNvGrpSpPr/>
+        <p:nvPr/>
+      </p:nvGrpSpPr>
+      <p:grpSpPr>
+        <a:xfrm>
+          <a:off x="0" y="0"/>
+          <a:ext cx="0" cy="0"/>
+          <a:chOff x="0" y="0"/>
+          <a:chExt cx="0" cy="0"/>
+        </a:xfrm>
+      </p:grpSpPr>
+      <p:sp>
+        <p:nvSpPr>
+          <p:cNvPr id="170" name="Shape 170"/>
+          <p:cNvSpPr>
+            <a:spLocks noGrp="1" noRot="1" noChangeAspect="1"/>
+          </p:cNvSpPr>
+          <p:nvPr>
+            <p:ph type="sldImg" idx="2"/>
+          </p:nvPr>
+        </p:nvSpPr>
+        <p:spPr>
+          <a:xfrm>
+            <a:off x="381000" y="685800"/>
+            <a:ext cx="6096000" cy="3429000"/>
+          </a:xfrm>
+          <a:custGeom>
+            <a:avLst/>
+            <a:gdLst/>
+            <a:ahLst/>
+            <a:cxnLst/>
+            <a:rect l="0" t="0" r="0" b="0"/>
+            <a:pathLst>
+              <a:path w="120000" h="120000" extrusionOk="0">
+                <a:moveTo>
+                  <a:pt x="0" y="0"/>
+                </a:moveTo>
+                <a:lnTo>
+                  <a:pt x="120000" y="0"/>
+                </a:lnTo>
+                <a:lnTo>
+                  <a:pt x="120000" y="120000"/>
+                </a:lnTo>
+                <a:lnTo>
+                  <a:pt x="0" y="120000"/>
+                </a:lnTo>
+                <a:close/>
+              </a:path>
+            </a:pathLst>
+          </a:custGeom>
+        </p:spPr>
+      </p:sp>
+      <p:sp>
+        <p:nvSpPr>
+          <p:cNvPr id="171" name="Shape 171"/>
+          <p:cNvSpPr txBox="1">
+            <a:spLocks noGrp="1"/>
+          </p:cNvSpPr>
+          <p:nvPr>
+            <p:ph type="body" idx="1"/>
+          </p:nvPr>
+        </p:nvSpPr>
+        <p:spPr>
+          <a:xfrm>
+            <a:off x="685800" y="4343400"/>
+            <a:ext cx="5486400" cy="4114800"/>
+          </a:xfrm>
+          <a:prstGeom prst="rect">
+            <a:avLst/>
+          </a:prstGeom>
+        </p:spPr>
+        <p:txBody>
+          <a:bodyPr lIns="91425" tIns="91425" rIns="91425" bIns="91425" anchor="t" anchorCtr="0">
+            <a:noAutofit/>
+          </a:bodyPr>
+          <a:lstStyle/>
+          <a:p>
+            <a:pPr lvl="0" rtl="0">
+              <a:spcBef>
+                <a:spcPts val="0"/>
+              </a:spcBef>
+              <a:buNone/>
+            </a:pPr>
+            <a:r>
+              <a:rPr lang="en-US" dirty="0"/>
+              <a:t>As you can see, a large percentage of the dataset has a steering angle of between -5 and +5 degrees.  This can potentially cause training issues where the algorithm may get 70% accuracy by just returning 0 as the answer! Obviously this won’t be a good thing in a real car!! </a:t>
+            </a:r>
+          </a:p>
+          <a:p>
+            <a:pPr lvl="0" rtl="0">
+              <a:spcBef>
+                <a:spcPts val="0"/>
+              </a:spcBef>
+              <a:buNone/>
+            </a:pPr>
+            <a:endParaRPr lang="en-US"/>
+          </a:p>
+          <a:p>
+            <a:pPr marL="0" marR="0" lvl="0" indent="0" algn="l" defTabSz="1828145" rtl="0" eaLnBrk="1" fontAlgn="auto" latinLnBrk="0" hangingPunct="1">
+              <a:lnSpc>
+                <a:spcPct val="100000"/>
+              </a:lnSpc>
+              <a:spcBef>
+                <a:spcPts val="0"/>
+              </a:spcBef>
+              <a:spcAft>
+                <a:spcPts val="0"/>
+              </a:spcAft>
+              <a:buClrTx/>
+              <a:buSzTx/>
+              <a:buFontTx/>
+              <a:buNone/>
+              <a:tabLst/>
+              <a:defRPr/>
+            </a:pPr>
+            <a:endParaRPr lang="en-US" dirty="0"/>
+          </a:p>
+          <a:p>
+            <a:pPr lvl="0">
+              <a:spcBef>
+                <a:spcPts val="0"/>
+              </a:spcBef>
+              <a:buNone/>
+            </a:pPr>
+            <a:endParaRPr dirty="0"/>
+          </a:p>
+        </p:txBody>
+      </p:sp>
+    </p:spTree>
+    <p:extLst>
+      <p:ext uri="{BB962C8B-B14F-4D97-AF65-F5344CB8AC3E}">
+        <p14:creationId xmlns:p14="http://schemas.microsoft.com/office/powerpoint/2010/main" val="2461616150"/>
+      </p:ext>
+    </p:extLst>
+  </p:cSld>
+  <p:clrMapOvr>
+    <a:masterClrMapping/>
+  </p:clrMapOvr>
+</p:notes>
+</file>
+
+<file path=ppt/notesSlides/notesSlide19.xml><?xml version="1.0" encoding="utf-8"?>
 <p:notes xmlns:a="http://schemas.openxmlformats.org/drawingml/2006/main" xmlns:r="http://schemas.openxmlformats.org/officeDocument/2006/relationships" xmlns:p="http://schemas.openxmlformats.org/presentationml/2006/main" showMasterSp="0" showMasterPhAnim="0">
   <p:cSld>
     <p:spTree>
@@ -1848,12 +1993,36 @@
             </a:pPr>
             <a:r>
               <a:rPr lang="en-US" dirty="0"/>
-              <a:t>This slide, like mentioned above is for multiple pointers. The information above covers the types</a:t>
-            </a:r>
-            <a:r>
-              <a:rPr lang="en-US" baseline="0" dirty="0"/>
-              <a:t> of information that can be used in this slide</a:t>
-            </a:r>
+              <a:t>This is the approach I use for training neural networks.  Typically I would perform the initial training and tuning locally to ensure the code is working and the model is starting to converge or a small number samples before moving to a cloud based server to train on the full dataset.</a:t>
+            </a:r>
+          </a:p>
+          <a:p>
+            <a:pPr lvl="0" rtl="0">
+              <a:spcBef>
+                <a:spcPts val="0"/>
+              </a:spcBef>
+              <a:buNone/>
+            </a:pPr>
+            <a:r>
+              <a:rPr lang="en-US" dirty="0"/>
+              <a:t>Also, </a:t>
+            </a:r>
+            <a:r>
+              <a:rPr lang="en-US" dirty="0" err="1"/>
+              <a:t>Keras</a:t>
+            </a:r>
+            <a:r>
+              <a:rPr lang="en-US" dirty="0"/>
+              <a:t> disables drop-out on validation so you will notice that the validation loss is often lower than the training loss.  This is OK if you have dropout in the network, but if you don’t and you see this, then you have issues relating to your data (for example you need to think about the split between train and validation more, such as validation may be skewed to a smaller set of examples than the training data)</a:t>
+            </a:r>
+          </a:p>
+          <a:p>
+            <a:pPr lvl="0" rtl="0">
+              <a:spcBef>
+                <a:spcPts val="0"/>
+              </a:spcBef>
+              <a:buNone/>
+            </a:pPr>
             <a:endParaRPr lang="en-US" dirty="0"/>
           </a:p>
           <a:p>
@@ -1879,117 +2048,7 @@
     </p:spTree>
     <p:extLst>
       <p:ext uri="{BB962C8B-B14F-4D97-AF65-F5344CB8AC3E}">
-        <p14:creationId xmlns:p14="http://schemas.microsoft.com/office/powerpoint/2010/main" val="1882602306"/>
-      </p:ext>
-    </p:extLst>
-  </p:cSld>
-  <p:clrMapOvr>
-    <a:masterClrMapping/>
-  </p:clrMapOvr>
-</p:notes>
-</file>
-
-<file path=ppt/notesSlides/notesSlide19.xml><?xml version="1.0" encoding="utf-8"?>
-<p:notes xmlns:a="http://schemas.openxmlformats.org/drawingml/2006/main" xmlns:r="http://schemas.openxmlformats.org/officeDocument/2006/relationships" xmlns:p="http://schemas.openxmlformats.org/presentationml/2006/main" showMasterSp="0" showMasterPhAnim="0">
-  <p:cSld>
-    <p:spTree>
-      <p:nvGrpSpPr>
-        <p:cNvPr id="1" name="Shape 151"/>
-        <p:cNvGrpSpPr/>
-        <p:nvPr/>
-      </p:nvGrpSpPr>
-      <p:grpSpPr>
-        <a:xfrm>
-          <a:off x="0" y="0"/>
-          <a:ext cx="0" cy="0"/>
-          <a:chOff x="0" y="0"/>
-          <a:chExt cx="0" cy="0"/>
-        </a:xfrm>
-      </p:grpSpPr>
-      <p:sp>
-        <p:nvSpPr>
-          <p:cNvPr id="152" name="Shape 152"/>
-          <p:cNvSpPr>
-            <a:spLocks noGrp="1" noRot="1" noChangeAspect="1"/>
-          </p:cNvSpPr>
-          <p:nvPr>
-            <p:ph type="sldImg" idx="2"/>
-          </p:nvPr>
-        </p:nvSpPr>
-        <p:spPr>
-          <a:xfrm>
-            <a:off x="381000" y="685800"/>
-            <a:ext cx="6096000" cy="3429000"/>
-          </a:xfrm>
-          <a:custGeom>
-            <a:avLst/>
-            <a:gdLst/>
-            <a:ahLst/>
-            <a:cxnLst/>
-            <a:rect l="0" t="0" r="0" b="0"/>
-            <a:pathLst>
-              <a:path w="120000" h="120000" extrusionOk="0">
-                <a:moveTo>
-                  <a:pt x="0" y="0"/>
-                </a:moveTo>
-                <a:lnTo>
-                  <a:pt x="120000" y="0"/>
-                </a:lnTo>
-                <a:lnTo>
-                  <a:pt x="120000" y="120000"/>
-                </a:lnTo>
-                <a:lnTo>
-                  <a:pt x="0" y="120000"/>
-                </a:lnTo>
-                <a:close/>
-              </a:path>
-            </a:pathLst>
-          </a:custGeom>
-        </p:spPr>
-      </p:sp>
-      <p:sp>
-        <p:nvSpPr>
-          <p:cNvPr id="153" name="Shape 153"/>
-          <p:cNvSpPr txBox="1">
-            <a:spLocks noGrp="1"/>
-          </p:cNvSpPr>
-          <p:nvPr>
-            <p:ph type="body" idx="1"/>
-          </p:nvPr>
-        </p:nvSpPr>
-        <p:spPr>
-          <a:xfrm>
-            <a:off x="685800" y="4343400"/>
-            <a:ext cx="5486400" cy="4114800"/>
-          </a:xfrm>
-          <a:prstGeom prst="rect">
-            <a:avLst/>
-          </a:prstGeom>
-        </p:spPr>
-        <p:txBody>
-          <a:bodyPr lIns="91425" tIns="91425" rIns="91425" bIns="91425" anchor="t" anchorCtr="0">
-            <a:noAutofit/>
-          </a:bodyPr>
-          <a:lstStyle/>
-          <a:p>
-            <a:pPr lvl="0" rtl="0">
-              <a:spcBef>
-                <a:spcPts val="0"/>
-              </a:spcBef>
-              <a:buNone/>
-            </a:pPr>
-            <a:r>
-              <a:rPr lang="en-US" dirty="0"/>
-              <a:t>In this section we are going to look at some of the computer vision and AI technology used in self driving cars, specifically an approach to predict the steering angle based on a feed of images of the road ahead.</a:t>
-            </a:r>
-            <a:endParaRPr dirty="0"/>
-          </a:p>
-        </p:txBody>
-      </p:sp>
-    </p:spTree>
-    <p:extLst>
-      <p:ext uri="{BB962C8B-B14F-4D97-AF65-F5344CB8AC3E}">
-        <p14:creationId xmlns:p14="http://schemas.microsoft.com/office/powerpoint/2010/main" val="4059420221"/>
+        <p14:creationId xmlns:p14="http://schemas.microsoft.com/office/powerpoint/2010/main" val="3163693538"/>
       </p:ext>
     </p:extLst>
   </p:cSld>
@@ -2237,23 +2296,6 @@
               </a:spcBef>
               <a:buNone/>
             </a:pPr>
-            <a:r>
-              <a:rPr lang="en-US" dirty="0"/>
-              <a:t>This slide, like mentioned above is for multiple pointers. The information above covers the types</a:t>
-            </a:r>
-            <a:r>
-              <a:rPr lang="en-US" baseline="0" dirty="0"/>
-              <a:t> of information that can be used in this slide</a:t>
-            </a:r>
-            <a:endParaRPr lang="en-US" dirty="0"/>
-          </a:p>
-          <a:p>
-            <a:pPr lvl="0" rtl="0">
-              <a:spcBef>
-                <a:spcPts val="0"/>
-              </a:spcBef>
-              <a:buNone/>
-            </a:pPr>
             <a:endParaRPr lang="en-US" dirty="0"/>
           </a:p>
           <a:p>
@@ -2270,7 +2312,7 @@
     </p:spTree>
     <p:extLst>
       <p:ext uri="{BB962C8B-B14F-4D97-AF65-F5344CB8AC3E}">
-        <p14:creationId xmlns:p14="http://schemas.microsoft.com/office/powerpoint/2010/main" val="4107019688"/>
+        <p14:creationId xmlns:p14="http://schemas.microsoft.com/office/powerpoint/2010/main" val="1882602306"/>
       </p:ext>
     </p:extLst>
   </p:cSld>
@@ -2281,6 +2323,116 @@
 </file>
 
 <file path=ppt/notesSlides/notesSlide21.xml><?xml version="1.0" encoding="utf-8"?>
+<p:notes xmlns:a="http://schemas.openxmlformats.org/drawingml/2006/main" xmlns:r="http://schemas.openxmlformats.org/officeDocument/2006/relationships" xmlns:p="http://schemas.openxmlformats.org/presentationml/2006/main" showMasterSp="0" showMasterPhAnim="0">
+  <p:cSld>
+    <p:spTree>
+      <p:nvGrpSpPr>
+        <p:cNvPr id="1" name="Shape 151"/>
+        <p:cNvGrpSpPr/>
+        <p:nvPr/>
+      </p:nvGrpSpPr>
+      <p:grpSpPr>
+        <a:xfrm>
+          <a:off x="0" y="0"/>
+          <a:ext cx="0" cy="0"/>
+          <a:chOff x="0" y="0"/>
+          <a:chExt cx="0" cy="0"/>
+        </a:xfrm>
+      </p:grpSpPr>
+      <p:sp>
+        <p:nvSpPr>
+          <p:cNvPr id="152" name="Shape 152"/>
+          <p:cNvSpPr>
+            <a:spLocks noGrp="1" noRot="1" noChangeAspect="1"/>
+          </p:cNvSpPr>
+          <p:nvPr>
+            <p:ph type="sldImg" idx="2"/>
+          </p:nvPr>
+        </p:nvSpPr>
+        <p:spPr>
+          <a:xfrm>
+            <a:off x="381000" y="685800"/>
+            <a:ext cx="6096000" cy="3429000"/>
+          </a:xfrm>
+          <a:custGeom>
+            <a:avLst/>
+            <a:gdLst/>
+            <a:ahLst/>
+            <a:cxnLst/>
+            <a:rect l="0" t="0" r="0" b="0"/>
+            <a:pathLst>
+              <a:path w="120000" h="120000" extrusionOk="0">
+                <a:moveTo>
+                  <a:pt x="0" y="0"/>
+                </a:moveTo>
+                <a:lnTo>
+                  <a:pt x="120000" y="0"/>
+                </a:lnTo>
+                <a:lnTo>
+                  <a:pt x="120000" y="120000"/>
+                </a:lnTo>
+                <a:lnTo>
+                  <a:pt x="0" y="120000"/>
+                </a:lnTo>
+                <a:close/>
+              </a:path>
+            </a:pathLst>
+          </a:custGeom>
+        </p:spPr>
+      </p:sp>
+      <p:sp>
+        <p:nvSpPr>
+          <p:cNvPr id="153" name="Shape 153"/>
+          <p:cNvSpPr txBox="1">
+            <a:spLocks noGrp="1"/>
+          </p:cNvSpPr>
+          <p:nvPr>
+            <p:ph type="body" idx="1"/>
+          </p:nvPr>
+        </p:nvSpPr>
+        <p:spPr>
+          <a:xfrm>
+            <a:off x="685800" y="4343400"/>
+            <a:ext cx="5486400" cy="4114800"/>
+          </a:xfrm>
+          <a:prstGeom prst="rect">
+            <a:avLst/>
+          </a:prstGeom>
+        </p:spPr>
+        <p:txBody>
+          <a:bodyPr lIns="91425" tIns="91425" rIns="91425" bIns="91425" anchor="t" anchorCtr="0">
+            <a:noAutofit/>
+          </a:bodyPr>
+          <a:lstStyle/>
+          <a:p>
+            <a:pPr lvl="0" rtl="0">
+              <a:spcBef>
+                <a:spcPts val="0"/>
+              </a:spcBef>
+              <a:buNone/>
+            </a:pPr>
+            <a:r>
+              <a:rPr lang="en-US" dirty="0"/>
+              <a:t>In this section we are going to look at some of the computer vision and AI technology used in self driving cars, specifically an approach to predict the steering angle based on a feed of images of the road ahead.</a:t>
+            </a:r>
+            <a:endParaRPr dirty="0"/>
+          </a:p>
+        </p:txBody>
+      </p:sp>
+    </p:spTree>
+    <p:extLst>
+      <p:ext uri="{BB962C8B-B14F-4D97-AF65-F5344CB8AC3E}">
+        <p14:creationId xmlns:p14="http://schemas.microsoft.com/office/powerpoint/2010/main" val="4059420221"/>
+      </p:ext>
+    </p:extLst>
+  </p:cSld>
+  <p:clrMapOvr>
+    <a:masterClrMapping/>
+  </p:clrMapOvr>
+</p:notes>
+</file>
+
+<file path=ppt/notesSlides/notesSlide22.xml><?xml version="1.0" encoding="utf-8"?>
 <p:notes xmlns:a="http://schemas.openxmlformats.org/drawingml/2006/main" xmlns:r="http://schemas.openxmlformats.org/officeDocument/2006/relationships" xmlns:p="http://schemas.openxmlformats.org/presentationml/2006/main" showMasterSp="0" showMasterPhAnim="0">
   <p:cSld>
     <p:spTree>
@@ -2371,6 +2523,285 @@
             </a:pPr>
             <a:r>
               <a:rPr lang="en-US" dirty="0"/>
+              <a:t>This slide, like mentioned above is for multiple pointers. The information above covers the types</a:t>
+            </a:r>
+            <a:r>
+              <a:rPr lang="en-US" baseline="0" dirty="0"/>
+              <a:t> of information that can be used in this slide</a:t>
+            </a:r>
+            <a:endParaRPr lang="en-US" dirty="0"/>
+          </a:p>
+          <a:p>
+            <a:pPr lvl="0" rtl="0">
+              <a:spcBef>
+                <a:spcPts val="0"/>
+              </a:spcBef>
+              <a:buNone/>
+            </a:pPr>
+            <a:endParaRPr lang="en-US" dirty="0"/>
+          </a:p>
+          <a:p>
+            <a:pPr lvl="0">
+              <a:spcBef>
+                <a:spcPts val="0"/>
+              </a:spcBef>
+              <a:buNone/>
+            </a:pPr>
+            <a:endParaRPr dirty="0"/>
+          </a:p>
+        </p:txBody>
+      </p:sp>
+    </p:spTree>
+    <p:extLst>
+      <p:ext uri="{BB962C8B-B14F-4D97-AF65-F5344CB8AC3E}">
+        <p14:creationId xmlns:p14="http://schemas.microsoft.com/office/powerpoint/2010/main" val="4107019688"/>
+      </p:ext>
+    </p:extLst>
+  </p:cSld>
+  <p:clrMapOvr>
+    <a:masterClrMapping/>
+  </p:clrMapOvr>
+</p:notes>
+</file>
+
+<file path=ppt/notesSlides/notesSlide23.xml><?xml version="1.0" encoding="utf-8"?>
+<p:notes xmlns:a="http://schemas.openxmlformats.org/drawingml/2006/main" xmlns:r="http://schemas.openxmlformats.org/officeDocument/2006/relationships" xmlns:p="http://schemas.openxmlformats.org/presentationml/2006/main" showMasterSp="0" showMasterPhAnim="0">
+  <p:cSld>
+    <p:spTree>
+      <p:nvGrpSpPr>
+        <p:cNvPr id="1" name="Shape 169"/>
+        <p:cNvGrpSpPr/>
+        <p:nvPr/>
+      </p:nvGrpSpPr>
+      <p:grpSpPr>
+        <a:xfrm>
+          <a:off x="0" y="0"/>
+          <a:ext cx="0" cy="0"/>
+          <a:chOff x="0" y="0"/>
+          <a:chExt cx="0" cy="0"/>
+        </a:xfrm>
+      </p:grpSpPr>
+      <p:sp>
+        <p:nvSpPr>
+          <p:cNvPr id="170" name="Shape 170"/>
+          <p:cNvSpPr>
+            <a:spLocks noGrp="1" noRot="1" noChangeAspect="1"/>
+          </p:cNvSpPr>
+          <p:nvPr>
+            <p:ph type="sldImg" idx="2"/>
+          </p:nvPr>
+        </p:nvSpPr>
+        <p:spPr>
+          <a:xfrm>
+            <a:off x="381000" y="685800"/>
+            <a:ext cx="6096000" cy="3429000"/>
+          </a:xfrm>
+          <a:custGeom>
+            <a:avLst/>
+            <a:gdLst/>
+            <a:ahLst/>
+            <a:cxnLst/>
+            <a:rect l="0" t="0" r="0" b="0"/>
+            <a:pathLst>
+              <a:path w="120000" h="120000" extrusionOk="0">
+                <a:moveTo>
+                  <a:pt x="0" y="0"/>
+                </a:moveTo>
+                <a:lnTo>
+                  <a:pt x="120000" y="0"/>
+                </a:lnTo>
+                <a:lnTo>
+                  <a:pt x="120000" y="120000"/>
+                </a:lnTo>
+                <a:lnTo>
+                  <a:pt x="0" y="120000"/>
+                </a:lnTo>
+                <a:close/>
+              </a:path>
+            </a:pathLst>
+          </a:custGeom>
+        </p:spPr>
+      </p:sp>
+      <p:sp>
+        <p:nvSpPr>
+          <p:cNvPr id="171" name="Shape 171"/>
+          <p:cNvSpPr txBox="1">
+            <a:spLocks noGrp="1"/>
+          </p:cNvSpPr>
+          <p:nvPr>
+            <p:ph type="body" idx="1"/>
+          </p:nvPr>
+        </p:nvSpPr>
+        <p:spPr>
+          <a:xfrm>
+            <a:off x="685800" y="4343400"/>
+            <a:ext cx="5486400" cy="4114800"/>
+          </a:xfrm>
+          <a:prstGeom prst="rect">
+            <a:avLst/>
+          </a:prstGeom>
+        </p:spPr>
+        <p:txBody>
+          <a:bodyPr lIns="91425" tIns="91425" rIns="91425" bIns="91425" anchor="t" anchorCtr="0">
+            <a:noAutofit/>
+          </a:bodyPr>
+          <a:lstStyle/>
+          <a:p>
+            <a:pPr lvl="0" rtl="0">
+              <a:spcBef>
+                <a:spcPts val="0"/>
+              </a:spcBef>
+              <a:buNone/>
+            </a:pPr>
+            <a:r>
+              <a:rPr lang="en-US" dirty="0"/>
+              <a:t>As you can see, a large percentage of the dataset has a steering angle of between -5 and +5 degrees.  This can potentially cause training issues where the algorithm may get 70% accuracy by just returning 0 as the answer! Obviously this won’t be a good thing in a real car!! </a:t>
+            </a:r>
+          </a:p>
+          <a:p>
+            <a:pPr lvl="0" rtl="0">
+              <a:spcBef>
+                <a:spcPts val="0"/>
+              </a:spcBef>
+              <a:buNone/>
+            </a:pPr>
+            <a:endParaRPr lang="en-US"/>
+          </a:p>
+          <a:p>
+            <a:pPr marL="0" marR="0" lvl="0" indent="0" algn="l" defTabSz="1828145" rtl="0" eaLnBrk="1" fontAlgn="auto" latinLnBrk="0" hangingPunct="1">
+              <a:lnSpc>
+                <a:spcPct val="100000"/>
+              </a:lnSpc>
+              <a:spcBef>
+                <a:spcPts val="0"/>
+              </a:spcBef>
+              <a:spcAft>
+                <a:spcPts val="0"/>
+              </a:spcAft>
+              <a:buClrTx/>
+              <a:buSzTx/>
+              <a:buFontTx/>
+              <a:buNone/>
+              <a:tabLst/>
+              <a:defRPr/>
+            </a:pPr>
+            <a:endParaRPr lang="en-US" dirty="0"/>
+          </a:p>
+          <a:p>
+            <a:pPr lvl="0">
+              <a:spcBef>
+                <a:spcPts val="0"/>
+              </a:spcBef>
+              <a:buNone/>
+            </a:pPr>
+            <a:endParaRPr dirty="0"/>
+          </a:p>
+        </p:txBody>
+      </p:sp>
+    </p:spTree>
+    <p:extLst>
+      <p:ext uri="{BB962C8B-B14F-4D97-AF65-F5344CB8AC3E}">
+        <p14:creationId xmlns:p14="http://schemas.microsoft.com/office/powerpoint/2010/main" val="3230928461"/>
+      </p:ext>
+    </p:extLst>
+  </p:cSld>
+  <p:clrMapOvr>
+    <a:masterClrMapping/>
+  </p:clrMapOvr>
+</p:notes>
+</file>
+
+<file path=ppt/notesSlides/notesSlide24.xml><?xml version="1.0" encoding="utf-8"?>
+<p:notes xmlns:a="http://schemas.openxmlformats.org/drawingml/2006/main" xmlns:r="http://schemas.openxmlformats.org/officeDocument/2006/relationships" xmlns:p="http://schemas.openxmlformats.org/presentationml/2006/main" showMasterSp="0" showMasterPhAnim="0">
+  <p:cSld>
+    <p:spTree>
+      <p:nvGrpSpPr>
+        <p:cNvPr id="1" name="Shape 144"/>
+        <p:cNvGrpSpPr/>
+        <p:nvPr/>
+      </p:nvGrpSpPr>
+      <p:grpSpPr>
+        <a:xfrm>
+          <a:off x="0" y="0"/>
+          <a:ext cx="0" cy="0"/>
+          <a:chOff x="0" y="0"/>
+          <a:chExt cx="0" cy="0"/>
+        </a:xfrm>
+      </p:grpSpPr>
+      <p:sp>
+        <p:nvSpPr>
+          <p:cNvPr id="145" name="Shape 145"/>
+          <p:cNvSpPr>
+            <a:spLocks noGrp="1" noRot="1" noChangeAspect="1"/>
+          </p:cNvSpPr>
+          <p:nvPr>
+            <p:ph type="sldImg" idx="2"/>
+          </p:nvPr>
+        </p:nvSpPr>
+        <p:spPr>
+          <a:xfrm>
+            <a:off x="381000" y="685800"/>
+            <a:ext cx="6096000" cy="3429000"/>
+          </a:xfrm>
+          <a:custGeom>
+            <a:avLst/>
+            <a:gdLst/>
+            <a:ahLst/>
+            <a:cxnLst/>
+            <a:rect l="0" t="0" r="0" b="0"/>
+            <a:pathLst>
+              <a:path w="120000" h="120000" extrusionOk="0">
+                <a:moveTo>
+                  <a:pt x="0" y="0"/>
+                </a:moveTo>
+                <a:lnTo>
+                  <a:pt x="120000" y="0"/>
+                </a:lnTo>
+                <a:lnTo>
+                  <a:pt x="120000" y="120000"/>
+                </a:lnTo>
+                <a:lnTo>
+                  <a:pt x="0" y="120000"/>
+                </a:lnTo>
+                <a:close/>
+              </a:path>
+            </a:pathLst>
+          </a:custGeom>
+        </p:spPr>
+      </p:sp>
+      <p:sp>
+        <p:nvSpPr>
+          <p:cNvPr id="146" name="Shape 146"/>
+          <p:cNvSpPr txBox="1">
+            <a:spLocks noGrp="1"/>
+          </p:cNvSpPr>
+          <p:nvPr>
+            <p:ph type="body" idx="1"/>
+          </p:nvPr>
+        </p:nvSpPr>
+        <p:spPr>
+          <a:xfrm>
+            <a:off x="685800" y="4343400"/>
+            <a:ext cx="5486400" cy="4114800"/>
+          </a:xfrm>
+          <a:prstGeom prst="rect">
+            <a:avLst/>
+          </a:prstGeom>
+        </p:spPr>
+        <p:txBody>
+          <a:bodyPr lIns="91425" tIns="91425" rIns="91425" bIns="91425" anchor="t" anchorCtr="0">
+            <a:noAutofit/>
+          </a:bodyPr>
+          <a:lstStyle/>
+          <a:p>
+            <a:pPr lvl="0" rtl="0">
+              <a:spcBef>
+                <a:spcPts val="0"/>
+              </a:spcBef>
+              <a:buNone/>
+            </a:pPr>
+            <a:r>
+              <a:rPr lang="en-US" dirty="0"/>
               <a:t>Some of the things that could be done to improve the model would be:</a:t>
             </a:r>
           </a:p>
@@ -2468,7 +2899,7 @@
 </p:notes>
 </file>
 
-<file path=ppt/notesSlides/notesSlide22.xml><?xml version="1.0" encoding="utf-8"?>
+<file path=ppt/notesSlides/notesSlide25.xml><?xml version="1.0" encoding="utf-8"?>
 <p:notes xmlns:a="http://schemas.openxmlformats.org/drawingml/2006/main" xmlns:r="http://schemas.openxmlformats.org/officeDocument/2006/relationships" xmlns:p="http://schemas.openxmlformats.org/presentationml/2006/main" showMasterSp="0" showMasterPhAnim="0">
   <p:cSld>
     <p:spTree>
@@ -5829,7 +6260,7 @@
                   <a:srgbClr val="434343"/>
                 </a:solidFill>
               </a:rPr>
-              <a:t>This model can be trained on a laptop or PC without a GPU</a:t>
+              <a:t>This model requires a powerful PC, preferably with a GPU, or use of a cloud GPU instance</a:t>
             </a:r>
           </a:p>
           <a:p>
@@ -5846,22 +6277,6 @@
                 </a:solidFill>
               </a:rPr>
               <a:t>It took many hours to train to a level where the predicted angles were accurate enough for demo purposes</a:t>
-            </a:r>
-          </a:p>
-          <a:p>
-            <a:pPr marL="914507" indent="-711281">
-              <a:buClr>
-                <a:srgbClr val="434343"/>
-              </a:buClr>
-              <a:buChar char="●"/>
-            </a:pPr>
-            <a:r>
-              <a:rPr lang="en-US" sz="4002" dirty="0">
-                <a:solidFill>
-                  <a:srgbClr val="434343"/>
-                </a:solidFill>
-              </a:rPr>
-              <a:t>Use of a more powerful laptop, or a server with a GPU will decrease training times (often significantly!!)</a:t>
             </a:r>
           </a:p>
           <a:p>
@@ -6407,23 +6822,6 @@
                 </a:solidFill>
               </a:rPr>
               <a:t>Creating training, validation and test datasets</a:t>
-            </a:r>
-          </a:p>
-          <a:p>
-            <a:pPr marL="914507" indent="-711281">
-              <a:buClr>
-                <a:srgbClr val="434343"/>
-              </a:buClr>
-              <a:buFont typeface="Calibri"/>
-              <a:buChar char="●"/>
-            </a:pPr>
-            <a:r>
-              <a:rPr lang="en-US" sz="4002" dirty="0">
-                <a:solidFill>
-                  <a:srgbClr val="434343"/>
-                </a:solidFill>
-              </a:rPr>
-              <a:t>Generators</a:t>
             </a:r>
           </a:p>
           <a:p>
@@ -6643,7 +7041,7 @@
           <p:nvPr/>
         </p:nvPicPr>
         <p:blipFill>
-          <a:blip r:embed="rId2"/>
+          <a:blip r:embed="rId3"/>
           <a:stretch>
             <a:fillRect/>
           </a:stretch>
@@ -6673,7 +7071,7 @@
           <p:nvPr/>
         </p:nvPicPr>
         <p:blipFill>
-          <a:blip r:embed="rId3"/>
+          <a:blip r:embed="rId4"/>
           <a:stretch>
             <a:fillRect/>
           </a:stretch>
@@ -6703,7 +7101,7 @@
           <p:nvPr/>
         </p:nvPicPr>
         <p:blipFill>
-          <a:blip r:embed="rId4"/>
+          <a:blip r:embed="rId5"/>
           <a:stretch>
             <a:fillRect/>
           </a:stretch>
@@ -6733,7 +7131,7 @@
           <p:nvPr/>
         </p:nvPicPr>
         <p:blipFill>
-          <a:blip r:embed="rId5"/>
+          <a:blip r:embed="rId6"/>
           <a:stretch>
             <a:fillRect/>
           </a:stretch>
@@ -6763,7 +7161,7 @@
           <p:nvPr/>
         </p:nvPicPr>
         <p:blipFill>
-          <a:blip r:embed="rId6"/>
+          <a:blip r:embed="rId7"/>
           <a:stretch>
             <a:fillRect/>
           </a:stretch>
@@ -6793,7 +7191,7 @@
           <p:nvPr/>
         </p:nvPicPr>
         <p:blipFill>
-          <a:blip r:embed="rId7"/>
+          <a:blip r:embed="rId8"/>
           <a:stretch>
             <a:fillRect/>
           </a:stretch>
@@ -6823,7 +7221,7 @@
           <p:nvPr/>
         </p:nvPicPr>
         <p:blipFill>
-          <a:blip r:embed="rId8"/>
+          <a:blip r:embed="rId9"/>
           <a:stretch>
             <a:fillRect/>
           </a:stretch>
@@ -6853,7 +7251,7 @@
           <p:nvPr/>
         </p:nvPicPr>
         <p:blipFill>
-          <a:blip r:embed="rId9"/>
+          <a:blip r:embed="rId10"/>
           <a:stretch>
             <a:fillRect/>
           </a:stretch>
@@ -7196,36 +7594,6 @@
           </a:prstGeom>
         </p:spPr>
       </p:pic>
-      <p:pic>
-        <p:nvPicPr>
-          <p:cNvPr id="5" name="Picture 4" descr="A sign on the side of a road&#13;&#10;&#13;&#10;Description automatically generated">
-            <a:extLst>
-              <a:ext uri="{FF2B5EF4-FFF2-40B4-BE49-F238E27FC236}">
-                <a16:creationId xmlns:a16="http://schemas.microsoft.com/office/drawing/2014/main" id="{FB8F78D3-6469-354C-8CF8-790AF468DA4A}"/>
-              </a:ext>
-            </a:extLst>
-          </p:cNvPr>
-          <p:cNvPicPr>
-            <a:picLocks noChangeAspect="1"/>
-          </p:cNvPicPr>
-          <p:nvPr/>
-        </p:nvPicPr>
-        <p:blipFill>
-          <a:blip r:embed="rId3"/>
-          <a:stretch>
-            <a:fillRect/>
-          </a:stretch>
-        </p:blipFill>
-        <p:spPr>
-          <a:xfrm>
-            <a:off x="11578892" y="6073084"/>
-            <a:ext cx="3894190" cy="1344012"/>
-          </a:xfrm>
-          <a:prstGeom prst="rect">
-            <a:avLst/>
-          </a:prstGeom>
-        </p:spPr>
-      </p:pic>
       <p:sp>
         <p:nvSpPr>
           <p:cNvPr id="16" name="Shape 149">
@@ -7614,6 +7982,86 @@
           </a:p>
         </p:txBody>
       </p:sp>
+      <p:pic>
+        <p:nvPicPr>
+          <p:cNvPr id="7" name="Picture 6">
+            <a:extLst>
+              <a:ext uri="{FF2B5EF4-FFF2-40B4-BE49-F238E27FC236}">
+                <a16:creationId xmlns:a16="http://schemas.microsoft.com/office/drawing/2014/main" id="{FCC6AD04-7951-624D-B022-7CBAADBFFF95}"/>
+              </a:ext>
+            </a:extLst>
+          </p:cNvPr>
+          <p:cNvPicPr>
+            <a:picLocks noChangeAspect="1"/>
+          </p:cNvPicPr>
+          <p:nvPr/>
+        </p:nvPicPr>
+        <p:blipFill rotWithShape="1">
+          <a:blip r:embed="rId2"/>
+          <a:srcRect t="39391" b="-39391"/>
+          <a:stretch/>
+        </p:blipFill>
+        <p:spPr>
+          <a:xfrm>
+            <a:off x="11190192" y="6011981"/>
+            <a:ext cx="4449553" cy="2508999"/>
+          </a:xfrm>
+          <a:prstGeom prst="rect">
+            <a:avLst/>
+          </a:prstGeom>
+        </p:spPr>
+      </p:pic>
+      <mc:AlternateContent xmlns:mc="http://schemas.openxmlformats.org/markup-compatibility/2006">
+        <mc:Choice xmlns:p14="http://schemas.microsoft.com/office/powerpoint/2010/main" Requires="p14">
+          <p:contentPart p14:bwMode="auto" r:id="rId3">
+            <p14:nvContentPartPr>
+              <p14:cNvPr id="3" name="Ink 2">
+                <a:extLst>
+                  <a:ext uri="{FF2B5EF4-FFF2-40B4-BE49-F238E27FC236}">
+                    <a16:creationId xmlns:a16="http://schemas.microsoft.com/office/drawing/2014/main" id="{6330F84A-302E-3740-B75A-7286AF9B2B03}"/>
+                  </a:ext>
+                </a:extLst>
+              </p14:cNvPr>
+              <p14:cNvContentPartPr/>
+              <p14:nvPr/>
+            </p14:nvContentPartPr>
+            <p14:xfrm>
+              <a:off x="6686449" y="6133856"/>
+              <a:ext cx="4680" cy="4680"/>
+            </p14:xfrm>
+          </p:contentPart>
+        </mc:Choice>
+        <mc:Fallback>
+          <p:pic>
+            <p:nvPicPr>
+              <p:cNvPr id="3" name="Ink 2">
+                <a:extLst>
+                  <a:ext uri="{FF2B5EF4-FFF2-40B4-BE49-F238E27FC236}">
+                    <a16:creationId xmlns:a16="http://schemas.microsoft.com/office/drawing/2014/main" id="{6330F84A-302E-3740-B75A-7286AF9B2B03}"/>
+                  </a:ext>
+                </a:extLst>
+              </p:cNvPr>
+              <p:cNvPicPr/>
+              <p:nvPr/>
+            </p:nvPicPr>
+            <p:blipFill>
+              <a:blip r:embed="rId4"/>
+              <a:stretch>
+                <a:fillRect/>
+              </a:stretch>
+            </p:blipFill>
+            <p:spPr>
+              <a:xfrm>
+                <a:off x="6677809" y="6124856"/>
+                <a:ext cx="22320" cy="22320"/>
+              </a:xfrm>
+              <a:prstGeom prst="rect">
+                <a:avLst/>
+              </a:prstGeom>
+            </p:spPr>
+          </p:pic>
+        </mc:Fallback>
+      </mc:AlternateContent>
     </p:spTree>
     <p:extLst>
       <p:ext uri="{BB962C8B-B14F-4D97-AF65-F5344CB8AC3E}">
@@ -7628,7 +8076,7 @@
 </file>
 
 <file path=ppt/slides/slide17.xml><?xml version="1.0" encoding="utf-8"?>
-<p:sld xmlns:a="http://schemas.openxmlformats.org/drawingml/2006/main" xmlns:r="http://schemas.openxmlformats.org/officeDocument/2006/relationships" xmlns:p="http://schemas.openxmlformats.org/presentationml/2006/main">
+<p:sld xmlns:a="http://schemas.openxmlformats.org/drawingml/2006/main" xmlns:r="http://schemas.openxmlformats.org/officeDocument/2006/relationships" xmlns:p="http://schemas.openxmlformats.org/presentationml/2006/main" show="0">
   <p:cSld>
     <p:spTree>
       <p:nvGrpSpPr>
@@ -7876,6 +8324,100 @@
           </a:p>
         </p:txBody>
       </p:sp>
+      <p:pic>
+        <p:nvPicPr>
+          <p:cNvPr id="3" name="Picture 2" descr="A screenshot of a cell phone&#13;&#10;&#13;&#10;Description automatically generated">
+            <a:extLst>
+              <a:ext uri="{FF2B5EF4-FFF2-40B4-BE49-F238E27FC236}">
+                <a16:creationId xmlns:a16="http://schemas.microsoft.com/office/drawing/2014/main" id="{08754724-7C1D-3949-915A-4C796CAD48AD}"/>
+              </a:ext>
+            </a:extLst>
+          </p:cNvPr>
+          <p:cNvPicPr>
+            <a:picLocks noChangeAspect="1"/>
+          </p:cNvPicPr>
+          <p:nvPr/>
+        </p:nvPicPr>
+        <p:blipFill>
+          <a:blip r:embed="rId3"/>
+          <a:stretch>
+            <a:fillRect/>
+          </a:stretch>
+        </p:blipFill>
+        <p:spPr>
+          <a:xfrm rot="5400000">
+            <a:off x="6902823" y="-2259104"/>
+            <a:ext cx="3514166" cy="15383436"/>
+          </a:xfrm>
+          <a:prstGeom prst="rect">
+            <a:avLst/>
+          </a:prstGeom>
+        </p:spPr>
+      </p:pic>
+      <p:pic>
+        <p:nvPicPr>
+          <p:cNvPr id="5" name="Picture 4">
+            <a:extLst>
+              <a:ext uri="{FF2B5EF4-FFF2-40B4-BE49-F238E27FC236}">
+                <a16:creationId xmlns:a16="http://schemas.microsoft.com/office/drawing/2014/main" id="{C0727B88-7B7B-A34E-B33D-30CFFB31EC9D}"/>
+              </a:ext>
+            </a:extLst>
+          </p:cNvPr>
+          <p:cNvPicPr>
+            <a:picLocks noChangeAspect="1"/>
+          </p:cNvPicPr>
+          <p:nvPr/>
+        </p:nvPicPr>
+        <p:blipFill rotWithShape="1">
+          <a:blip r:embed="rId4"/>
+          <a:srcRect t="39391" b="-39391"/>
+          <a:stretch/>
+        </p:blipFill>
+        <p:spPr>
+          <a:xfrm rot="5400000">
+            <a:off x="14614709" y="4178114"/>
+            <a:ext cx="4449553" cy="2508999"/>
+          </a:xfrm>
+          <a:prstGeom prst="rect">
+            <a:avLst/>
+          </a:prstGeom>
+        </p:spPr>
+      </p:pic>
+      <p:sp>
+        <p:nvSpPr>
+          <p:cNvPr id="4" name="TextBox 3">
+            <a:extLst>
+              <a:ext uri="{FF2B5EF4-FFF2-40B4-BE49-F238E27FC236}">
+                <a16:creationId xmlns:a16="http://schemas.microsoft.com/office/drawing/2014/main" id="{2A7B5968-FBD4-5047-9B6B-A11D6B6F310F}"/>
+              </a:ext>
+            </a:extLst>
+          </p:cNvPr>
+          <p:cNvSpPr txBox="1"/>
+          <p:nvPr/>
+        </p:nvSpPr>
+        <p:spPr>
+          <a:xfrm rot="5400000">
+            <a:off x="-99068" y="5170842"/>
+            <a:ext cx="1106393" cy="523541"/>
+          </a:xfrm>
+          <a:prstGeom prst="rect">
+            <a:avLst/>
+          </a:prstGeom>
+          <a:noFill/>
+        </p:spPr>
+        <p:txBody>
+          <a:bodyPr wrap="none" rtlCol="0">
+            <a:spAutoFit/>
+          </a:bodyPr>
+          <a:lstStyle/>
+          <a:p>
+            <a:r>
+              <a:rPr lang="en-US" dirty="0"/>
+              <a:t>Angle</a:t>
+            </a:r>
+          </a:p>
+        </p:txBody>
+      </p:sp>
     </p:spTree>
     <p:extLst>
       <p:ext uri="{BB962C8B-B14F-4D97-AF65-F5344CB8AC3E}">
@@ -7894,7 +8436,7 @@
   <p:cSld>
     <p:spTree>
       <p:nvGrpSpPr>
-        <p:cNvPr id="1" name="Shape 147"/>
+        <p:cNvPr id="1" name="Shape 172"/>
         <p:cNvGrpSpPr/>
         <p:nvPr/>
       </p:nvGrpSpPr>
@@ -7908,7 +8450,7 @@
       </p:grpSpPr>
       <p:sp>
         <p:nvSpPr>
-          <p:cNvPr id="148" name="Shape 148"/>
+          <p:cNvPr id="173" name="Shape 173"/>
           <p:cNvSpPr txBox="1">
             <a:spLocks noGrp="1"/>
           </p:cNvSpPr>
@@ -7918,8 +8460,8 @@
         </p:nvSpPr>
         <p:spPr>
           <a:xfrm>
-            <a:off x="192358" y="32689"/>
-            <a:ext cx="17661379" cy="1204842"/>
+            <a:off x="976721" y="976049"/>
+            <a:ext cx="16075446" cy="8177813"/>
           </a:xfrm>
           <a:prstGeom prst="rect">
             <a:avLst/>
@@ -7931,256 +8473,20 @@
           </a:bodyPr>
           <a:lstStyle/>
           <a:p>
-            <a:pPr algn="ctr"/>
-            <a:r>
-              <a:rPr lang="en" sz="4402" dirty="0"/>
-              <a:t>Debugging Neural Networks</a:t>
-            </a:r>
-          </a:p>
-        </p:txBody>
-      </p:sp>
-      <p:sp>
-        <p:nvSpPr>
-          <p:cNvPr id="149" name="Shape 149"/>
-          <p:cNvSpPr txBox="1">
-            <a:spLocks noGrp="1"/>
-          </p:cNvSpPr>
-          <p:nvPr>
-            <p:ph type="body" idx="4294967295"/>
-          </p:nvPr>
-        </p:nvSpPr>
-        <p:spPr>
-          <a:xfrm>
-            <a:off x="413459" y="1776131"/>
-            <a:ext cx="17440478" cy="8042873"/>
-          </a:xfrm>
-          <a:prstGeom prst="rect">
-            <a:avLst/>
-          </a:prstGeom>
-        </p:spPr>
-        <p:txBody>
-          <a:bodyPr lIns="182874" tIns="182874" rIns="182874" bIns="182874" anchor="t" anchorCtr="0">
-            <a:noAutofit/>
-          </a:bodyPr>
-          <a:lstStyle/>
-          <a:p>
-            <a:pPr marL="914507" indent="-711281">
-              <a:buClr>
-                <a:srgbClr val="434343"/>
-              </a:buClr>
-              <a:buFont typeface="Calibri"/>
-              <a:buChar char="●"/>
-            </a:pPr>
-            <a:r>
-              <a:rPr lang="en-US" sz="4002" dirty="0">
-                <a:solidFill>
-                  <a:srgbClr val="434343"/>
-                </a:solidFill>
-              </a:rPr>
-              <a:t>Training neural networks can be more trial-and-error than science</a:t>
-            </a:r>
-          </a:p>
-          <a:p>
-            <a:pPr marL="914507" indent="-711281">
-              <a:buClr>
-                <a:srgbClr val="434343"/>
-              </a:buClr>
-              <a:buFont typeface="Calibri"/>
-              <a:buChar char="●"/>
-            </a:pPr>
-            <a:r>
-              <a:rPr lang="en-US" sz="4002" dirty="0">
-                <a:solidFill>
-                  <a:srgbClr val="434343"/>
-                </a:solidFill>
-              </a:rPr>
-              <a:t>Prove the code works by running a small number of samples and a single batch</a:t>
-            </a:r>
-          </a:p>
-          <a:p>
-            <a:pPr marL="914507" indent="-711281">
-              <a:buClr>
-                <a:srgbClr val="434343"/>
-              </a:buClr>
-              <a:buFont typeface="Calibri"/>
-              <a:buChar char="●"/>
-            </a:pPr>
-            <a:r>
-              <a:rPr lang="en-US" sz="4002" dirty="0">
-                <a:solidFill>
-                  <a:srgbClr val="434343"/>
-                </a:solidFill>
-              </a:rPr>
-              <a:t>Train using a small number of samples to check that the model converges and you see overfitting</a:t>
-            </a:r>
-          </a:p>
-          <a:p>
-            <a:pPr marL="914507" indent="-711281">
-              <a:buClr>
-                <a:srgbClr val="434343"/>
-              </a:buClr>
-              <a:buFont typeface="Calibri"/>
-              <a:buChar char="●"/>
-            </a:pPr>
-            <a:r>
-              <a:rPr lang="en-US" sz="4002" dirty="0">
-                <a:solidFill>
-                  <a:srgbClr val="434343"/>
-                </a:solidFill>
-              </a:rPr>
-              <a:t>Increase the number of samples over time</a:t>
-            </a:r>
-          </a:p>
-          <a:p>
-            <a:pPr marL="914507" indent="-711281">
-              <a:buClr>
-                <a:srgbClr val="434343"/>
-              </a:buClr>
-              <a:buFont typeface="Calibri"/>
-              <a:buChar char="●"/>
-            </a:pPr>
-            <a:r>
-              <a:rPr lang="en-US" sz="4002" dirty="0">
-                <a:solidFill>
-                  <a:srgbClr val="434343"/>
-                </a:solidFill>
-              </a:rPr>
-              <a:t>Make changes to the network architecture, hyper-parameters, etc. to find an optimal solution</a:t>
-            </a:r>
-          </a:p>
-          <a:p>
-            <a:pPr marL="914507" indent="-711281">
-              <a:buClr>
-                <a:srgbClr val="434343"/>
-              </a:buClr>
-              <a:buFont typeface="Calibri"/>
-              <a:buChar char="●"/>
-            </a:pPr>
-            <a:r>
-              <a:rPr lang="en-US" sz="4002" dirty="0">
-                <a:solidFill>
-                  <a:srgbClr val="434343"/>
-                </a:solidFill>
-              </a:rPr>
-              <a:t>Then scale to the full dataset</a:t>
-            </a:r>
-          </a:p>
-          <a:p>
-            <a:pPr marL="914507" indent="-711281">
-              <a:buClr>
-                <a:srgbClr val="434343"/>
-              </a:buClr>
-              <a:buFont typeface="Calibri"/>
-              <a:buChar char="●"/>
-            </a:pPr>
-            <a:r>
-              <a:rPr lang="en-US" sz="2400" dirty="0">
-                <a:solidFill>
-                  <a:srgbClr val="434343"/>
-                </a:solidFill>
-              </a:rPr>
-              <a:t>See </a:t>
-            </a:r>
-            <a:r>
-              <a:rPr lang="en-US" sz="2400" dirty="0">
-                <a:solidFill>
-                  <a:srgbClr val="434343"/>
-                </a:solidFill>
-                <a:hlinkClick r:id="rId3"/>
-              </a:rPr>
-              <a:t>https://keras.io/getting-started/faq/#why-is-the-training-loss-much-higher-than-the-testing-loss</a:t>
-            </a:r>
-            <a:r>
-              <a:rPr lang="en-US" sz="2400" dirty="0">
-                <a:solidFill>
-                  <a:srgbClr val="434343"/>
-                </a:solidFill>
-              </a:rPr>
-              <a:t> </a:t>
-            </a:r>
-          </a:p>
-          <a:p>
-            <a:pPr marL="914507" indent="-711281">
-              <a:buClr>
-                <a:srgbClr val="434343"/>
-              </a:buClr>
-              <a:buFont typeface="Calibri"/>
-              <a:buChar char="●"/>
-            </a:pPr>
-            <a:endParaRPr lang="en-US" sz="4002" dirty="0">
-              <a:solidFill>
-                <a:srgbClr val="434343"/>
-              </a:solidFill>
-            </a:endParaRPr>
-          </a:p>
-          <a:p>
-            <a:pPr marL="914507" indent="-711281">
-              <a:buClr>
-                <a:srgbClr val="434343"/>
-              </a:buClr>
-              <a:buChar char="●"/>
-            </a:pPr>
-            <a:endParaRPr lang="en-US" sz="4002" dirty="0">
-              <a:solidFill>
-                <a:srgbClr val="434343"/>
-              </a:solidFill>
-            </a:endParaRPr>
-          </a:p>
-          <a:p>
-            <a:pPr marL="914507" indent="-711281">
-              <a:buClr>
-                <a:srgbClr val="434343"/>
-              </a:buClr>
-              <a:buChar char="●"/>
-            </a:pPr>
-            <a:endParaRPr lang="en-US" sz="4002" dirty="0">
-              <a:solidFill>
-                <a:srgbClr val="434343"/>
-              </a:solidFill>
-            </a:endParaRPr>
-          </a:p>
-          <a:p>
-            <a:pPr marL="203226" lvl="1">
-              <a:buClr>
-                <a:srgbClr val="434343"/>
-              </a:buClr>
-            </a:pPr>
-            <a:r>
-              <a:rPr lang="en-GB" sz="3200" dirty="0">
-                <a:solidFill>
-                  <a:srgbClr val="434343"/>
-                </a:solidFill>
+            <a:r>
+              <a:rPr lang="en" dirty="0">
                 <a:latin typeface="Consolas" panose="020B0609020204030204" pitchFamily="49" charset="0"/>
                 <a:cs typeface="Consolas" panose="020B0609020204030204" pitchFamily="49" charset="0"/>
               </a:rPr>
-              <a:t>		</a:t>
-            </a:r>
-            <a:endParaRPr lang="en-US" sz="4002" dirty="0">
-              <a:solidFill>
-                <a:srgbClr val="434343"/>
-              </a:solidFill>
-            </a:endParaRPr>
-          </a:p>
-          <a:p>
-            <a:pPr marL="774726" indent="-571500">
-              <a:buClr>
-                <a:srgbClr val="434343"/>
-              </a:buClr>
-              <a:buFont typeface="Arial" panose="020B0604020202020204" pitchFamily="34" charset="0"/>
-              <a:buChar char="•"/>
-            </a:pPr>
-            <a:endParaRPr lang="en" sz="4002" dirty="0">
-              <a:solidFill>
-                <a:srgbClr val="434343"/>
-              </a:solidFill>
-            </a:endParaRPr>
+              <a:t>Let’s explore the code…</a:t>
+            </a:r>
           </a:p>
         </p:txBody>
       </p:sp>
     </p:spTree>
     <p:extLst>
       <p:ext uri="{BB962C8B-B14F-4D97-AF65-F5344CB8AC3E}">
-        <p14:creationId xmlns:p14="http://schemas.microsoft.com/office/powerpoint/2010/main" val="3367407288"/>
+        <p14:creationId xmlns:p14="http://schemas.microsoft.com/office/powerpoint/2010/main" val="2039812599"/>
       </p:ext>
     </p:extLst>
   </p:cSld>
@@ -8299,6 +8605,307 @@
           <a:p>
             <a:pPr algn="ctr"/>
             <a:r>
+              <a:rPr lang="en" sz="4402" dirty="0"/>
+              <a:t>Debugging Neural Networks</a:t>
+            </a:r>
+          </a:p>
+        </p:txBody>
+      </p:sp>
+      <p:sp>
+        <p:nvSpPr>
+          <p:cNvPr id="149" name="Shape 149"/>
+          <p:cNvSpPr txBox="1">
+            <a:spLocks noGrp="1"/>
+          </p:cNvSpPr>
+          <p:nvPr>
+            <p:ph type="body" idx="4294967295"/>
+          </p:nvPr>
+        </p:nvSpPr>
+        <p:spPr>
+          <a:xfrm>
+            <a:off x="413459" y="1776131"/>
+            <a:ext cx="17440478" cy="8042873"/>
+          </a:xfrm>
+          <a:prstGeom prst="rect">
+            <a:avLst/>
+          </a:prstGeom>
+        </p:spPr>
+        <p:txBody>
+          <a:bodyPr lIns="182874" tIns="182874" rIns="182874" bIns="182874" anchor="t" anchorCtr="0">
+            <a:noAutofit/>
+          </a:bodyPr>
+          <a:lstStyle/>
+          <a:p>
+            <a:pPr marL="914507" indent="-711281">
+              <a:buClr>
+                <a:srgbClr val="434343"/>
+              </a:buClr>
+              <a:buFont typeface="Calibri"/>
+              <a:buChar char="●"/>
+            </a:pPr>
+            <a:r>
+              <a:rPr lang="en-US" sz="4002" dirty="0">
+                <a:solidFill>
+                  <a:srgbClr val="434343"/>
+                </a:solidFill>
+              </a:rPr>
+              <a:t>Training neural networks can be more trial-and-error than science</a:t>
+            </a:r>
+          </a:p>
+          <a:p>
+            <a:pPr marL="914507" indent="-711281">
+              <a:buClr>
+                <a:srgbClr val="434343"/>
+              </a:buClr>
+              <a:buFont typeface="Calibri"/>
+              <a:buChar char="●"/>
+            </a:pPr>
+            <a:r>
+              <a:rPr lang="en-US" sz="4002" dirty="0">
+                <a:solidFill>
+                  <a:srgbClr val="434343"/>
+                </a:solidFill>
+              </a:rPr>
+              <a:t>Prove the code works by running a small number of samples and a single batch</a:t>
+            </a:r>
+          </a:p>
+          <a:p>
+            <a:pPr marL="914507" indent="-711281">
+              <a:buClr>
+                <a:srgbClr val="434343"/>
+              </a:buClr>
+              <a:buFont typeface="Calibri"/>
+              <a:buChar char="●"/>
+            </a:pPr>
+            <a:r>
+              <a:rPr lang="en-US" sz="4002" dirty="0">
+                <a:solidFill>
+                  <a:srgbClr val="434343"/>
+                </a:solidFill>
+              </a:rPr>
+              <a:t>Train using a small number of samples to check that the model converges and you see overfitting</a:t>
+            </a:r>
+          </a:p>
+          <a:p>
+            <a:pPr marL="914507" indent="-711281">
+              <a:buClr>
+                <a:srgbClr val="434343"/>
+              </a:buClr>
+              <a:buFont typeface="Calibri"/>
+              <a:buChar char="●"/>
+            </a:pPr>
+            <a:r>
+              <a:rPr lang="en-US" sz="4002" dirty="0">
+                <a:solidFill>
+                  <a:srgbClr val="434343"/>
+                </a:solidFill>
+              </a:rPr>
+              <a:t>Increase the number of samples over time</a:t>
+            </a:r>
+          </a:p>
+          <a:p>
+            <a:pPr marL="914507" indent="-711281">
+              <a:buClr>
+                <a:srgbClr val="434343"/>
+              </a:buClr>
+              <a:buFont typeface="Calibri"/>
+              <a:buChar char="●"/>
+            </a:pPr>
+            <a:r>
+              <a:rPr lang="en-US" sz="4002" dirty="0">
+                <a:solidFill>
+                  <a:srgbClr val="434343"/>
+                </a:solidFill>
+              </a:rPr>
+              <a:t>Make changes to the network architecture, hyper-parameters, etc. to find an optimal solution</a:t>
+            </a:r>
+          </a:p>
+          <a:p>
+            <a:pPr marL="914507" indent="-711281">
+              <a:buClr>
+                <a:srgbClr val="434343"/>
+              </a:buClr>
+              <a:buFont typeface="Calibri"/>
+              <a:buChar char="●"/>
+            </a:pPr>
+            <a:r>
+              <a:rPr lang="en-US" sz="4002" dirty="0">
+                <a:solidFill>
+                  <a:srgbClr val="434343"/>
+                </a:solidFill>
+              </a:rPr>
+              <a:t>Then scale to the full dataset</a:t>
+            </a:r>
+          </a:p>
+          <a:p>
+            <a:pPr marL="914507" indent="-711281">
+              <a:buClr>
+                <a:srgbClr val="434343"/>
+              </a:buClr>
+              <a:buFont typeface="Calibri"/>
+              <a:buChar char="●"/>
+            </a:pPr>
+            <a:r>
+              <a:rPr lang="en-US" sz="2400" dirty="0">
+                <a:solidFill>
+                  <a:srgbClr val="434343"/>
+                </a:solidFill>
+              </a:rPr>
+              <a:t>See </a:t>
+            </a:r>
+            <a:r>
+              <a:rPr lang="en-US" sz="2400" dirty="0">
+                <a:solidFill>
+                  <a:srgbClr val="434343"/>
+                </a:solidFill>
+                <a:hlinkClick r:id="rId3"/>
+              </a:rPr>
+              <a:t>https://keras.io/getting-started/faq/#why-is-the-training-loss-much-higher-than-the-testing-loss</a:t>
+            </a:r>
+            <a:r>
+              <a:rPr lang="en-US" sz="2400" dirty="0">
+                <a:solidFill>
+                  <a:srgbClr val="434343"/>
+                </a:solidFill>
+              </a:rPr>
+              <a:t> </a:t>
+            </a:r>
+          </a:p>
+          <a:p>
+            <a:pPr marL="914507" indent="-711281">
+              <a:buClr>
+                <a:srgbClr val="434343"/>
+              </a:buClr>
+              <a:buFont typeface="Calibri"/>
+              <a:buChar char="●"/>
+            </a:pPr>
+            <a:endParaRPr lang="en-US" sz="4002" dirty="0">
+              <a:solidFill>
+                <a:srgbClr val="434343"/>
+              </a:solidFill>
+            </a:endParaRPr>
+          </a:p>
+          <a:p>
+            <a:pPr marL="914507" indent="-711281">
+              <a:buClr>
+                <a:srgbClr val="434343"/>
+              </a:buClr>
+              <a:buChar char="●"/>
+            </a:pPr>
+            <a:endParaRPr lang="en-US" sz="4002" dirty="0">
+              <a:solidFill>
+                <a:srgbClr val="434343"/>
+              </a:solidFill>
+            </a:endParaRPr>
+          </a:p>
+          <a:p>
+            <a:pPr marL="914507" indent="-711281">
+              <a:buClr>
+                <a:srgbClr val="434343"/>
+              </a:buClr>
+              <a:buChar char="●"/>
+            </a:pPr>
+            <a:endParaRPr lang="en-US" sz="4002" dirty="0">
+              <a:solidFill>
+                <a:srgbClr val="434343"/>
+              </a:solidFill>
+            </a:endParaRPr>
+          </a:p>
+          <a:p>
+            <a:pPr marL="203226" lvl="1">
+              <a:buClr>
+                <a:srgbClr val="434343"/>
+              </a:buClr>
+            </a:pPr>
+            <a:r>
+              <a:rPr lang="en-GB" sz="3200" dirty="0">
+                <a:solidFill>
+                  <a:srgbClr val="434343"/>
+                </a:solidFill>
+                <a:latin typeface="Consolas" panose="020B0609020204030204" pitchFamily="49" charset="0"/>
+                <a:cs typeface="Consolas" panose="020B0609020204030204" pitchFamily="49" charset="0"/>
+              </a:rPr>
+              <a:t>		</a:t>
+            </a:r>
+            <a:endParaRPr lang="en-US" sz="4002" dirty="0">
+              <a:solidFill>
+                <a:srgbClr val="434343"/>
+              </a:solidFill>
+            </a:endParaRPr>
+          </a:p>
+          <a:p>
+            <a:pPr marL="774726" indent="-571500">
+              <a:buClr>
+                <a:srgbClr val="434343"/>
+              </a:buClr>
+              <a:buFont typeface="Arial" panose="020B0604020202020204" pitchFamily="34" charset="0"/>
+              <a:buChar char="•"/>
+            </a:pPr>
+            <a:endParaRPr lang="en" sz="4002" dirty="0">
+              <a:solidFill>
+                <a:srgbClr val="434343"/>
+              </a:solidFill>
+            </a:endParaRPr>
+          </a:p>
+        </p:txBody>
+      </p:sp>
+    </p:spTree>
+    <p:extLst>
+      <p:ext uri="{BB962C8B-B14F-4D97-AF65-F5344CB8AC3E}">
+        <p14:creationId xmlns:p14="http://schemas.microsoft.com/office/powerpoint/2010/main" val="3367407288"/>
+      </p:ext>
+    </p:extLst>
+  </p:cSld>
+  <p:clrMapOvr>
+    <a:masterClrMapping/>
+  </p:clrMapOvr>
+</p:sld>
+</file>
+
+<file path=ppt/slides/slide21.xml><?xml version="1.0" encoding="utf-8"?>
+<p:sld xmlns:a="http://schemas.openxmlformats.org/drawingml/2006/main" xmlns:r="http://schemas.openxmlformats.org/officeDocument/2006/relationships" xmlns:p="http://schemas.openxmlformats.org/presentationml/2006/main">
+  <p:cSld>
+    <p:spTree>
+      <p:nvGrpSpPr>
+        <p:cNvPr id="1" name="Shape 147"/>
+        <p:cNvGrpSpPr/>
+        <p:nvPr/>
+      </p:nvGrpSpPr>
+      <p:grpSpPr>
+        <a:xfrm>
+          <a:off x="0" y="0"/>
+          <a:ext cx="0" cy="0"/>
+          <a:chOff x="0" y="0"/>
+          <a:chExt cx="0" cy="0"/>
+        </a:xfrm>
+      </p:grpSpPr>
+      <p:sp>
+        <p:nvSpPr>
+          <p:cNvPr id="148" name="Shape 148"/>
+          <p:cNvSpPr txBox="1">
+            <a:spLocks noGrp="1"/>
+          </p:cNvSpPr>
+          <p:nvPr>
+            <p:ph type="title"/>
+          </p:nvPr>
+        </p:nvSpPr>
+        <p:spPr>
+          <a:xfrm>
+            <a:off x="192358" y="32689"/>
+            <a:ext cx="17661379" cy="1204842"/>
+          </a:xfrm>
+          <a:prstGeom prst="rect">
+            <a:avLst/>
+          </a:prstGeom>
+        </p:spPr>
+        <p:txBody>
+          <a:bodyPr lIns="182874" tIns="182874" rIns="182874" bIns="182874" anchor="ctr" anchorCtr="0">
+            <a:noAutofit/>
+          </a:bodyPr>
+          <a:lstStyle/>
+          <a:p>
+            <a:pPr algn="ctr"/>
+            <a:r>
               <a:rPr lang="en" sz="4402" dirty="0" err="1"/>
               <a:t>Analysing</a:t>
             </a:r>
@@ -8483,7 +9090,7 @@
 </p:sld>
 </file>
 
-<file path=ppt/slides/slide21.xml><?xml version="1.0" encoding="utf-8"?>
+<file path=ppt/slides/slide22.xml><?xml version="1.0" encoding="utf-8"?>
 <p:sld xmlns:a="http://schemas.openxmlformats.org/drawingml/2006/main" xmlns:r="http://schemas.openxmlformats.org/officeDocument/2006/relationships" xmlns:p="http://schemas.openxmlformats.org/presentationml/2006/main">
   <p:cSld>
     <p:bg>
@@ -8545,208 +9152,6 @@
     <p:extLst>
       <p:ext uri="{BB962C8B-B14F-4D97-AF65-F5344CB8AC3E}">
         <p14:creationId xmlns:p14="http://schemas.microsoft.com/office/powerpoint/2010/main" val="592704715"/>
-      </p:ext>
-    </p:extLst>
-  </p:cSld>
-  <p:clrMapOvr>
-    <a:masterClrMapping/>
-  </p:clrMapOvr>
-</p:sld>
-</file>
-
-<file path=ppt/slides/slide22.xml><?xml version="1.0" encoding="utf-8"?>
-<p:sld xmlns:a="http://schemas.openxmlformats.org/drawingml/2006/main" xmlns:r="http://schemas.openxmlformats.org/officeDocument/2006/relationships" xmlns:p="http://schemas.openxmlformats.org/presentationml/2006/main">
-  <p:cSld>
-    <p:spTree>
-      <p:nvGrpSpPr>
-        <p:cNvPr id="1" name="Shape 147"/>
-        <p:cNvGrpSpPr/>
-        <p:nvPr/>
-      </p:nvGrpSpPr>
-      <p:grpSpPr>
-        <a:xfrm>
-          <a:off x="0" y="0"/>
-          <a:ext cx="0" cy="0"/>
-          <a:chOff x="0" y="0"/>
-          <a:chExt cx="0" cy="0"/>
-        </a:xfrm>
-      </p:grpSpPr>
-      <p:sp>
-        <p:nvSpPr>
-          <p:cNvPr id="148" name="Shape 148"/>
-          <p:cNvSpPr txBox="1">
-            <a:spLocks noGrp="1"/>
-          </p:cNvSpPr>
-          <p:nvPr>
-            <p:ph type="title"/>
-          </p:nvPr>
-        </p:nvSpPr>
-        <p:spPr>
-          <a:xfrm>
-            <a:off x="192358" y="32689"/>
-            <a:ext cx="17661379" cy="1204842"/>
-          </a:xfrm>
-          <a:prstGeom prst="rect">
-            <a:avLst/>
-          </a:prstGeom>
-        </p:spPr>
-        <p:txBody>
-          <a:bodyPr lIns="182874" tIns="182874" rIns="182874" bIns="182874" anchor="ctr" anchorCtr="0">
-            <a:noAutofit/>
-          </a:bodyPr>
-          <a:lstStyle/>
-          <a:p>
-            <a:pPr algn="ctr"/>
-            <a:r>
-              <a:rPr lang="en" sz="4402" dirty="0"/>
-              <a:t>Testing Our Model</a:t>
-            </a:r>
-          </a:p>
-        </p:txBody>
-      </p:sp>
-      <p:sp>
-        <p:nvSpPr>
-          <p:cNvPr id="149" name="Shape 149"/>
-          <p:cNvSpPr txBox="1">
-            <a:spLocks noGrp="1"/>
-          </p:cNvSpPr>
-          <p:nvPr>
-            <p:ph type="body" idx="4294967295"/>
-          </p:nvPr>
-        </p:nvSpPr>
-        <p:spPr>
-          <a:xfrm>
-            <a:off x="413459" y="1776131"/>
-            <a:ext cx="17440478" cy="8042873"/>
-          </a:xfrm>
-          <a:prstGeom prst="rect">
-            <a:avLst/>
-          </a:prstGeom>
-        </p:spPr>
-        <p:txBody>
-          <a:bodyPr lIns="182874" tIns="182874" rIns="182874" bIns="182874" anchor="t" anchorCtr="0">
-            <a:noAutofit/>
-          </a:bodyPr>
-          <a:lstStyle/>
-          <a:p>
-            <a:pPr marL="914507" indent="-711281">
-              <a:buClr>
-                <a:srgbClr val="434343"/>
-              </a:buClr>
-              <a:buChar char="●"/>
-            </a:pPr>
-            <a:r>
-              <a:rPr lang="en-US" sz="4002" dirty="0">
-                <a:solidFill>
-                  <a:srgbClr val="434343"/>
-                </a:solidFill>
-              </a:rPr>
-              <a:t>Testing model accuracy</a:t>
-            </a:r>
-          </a:p>
-          <a:p>
-            <a:pPr marL="914507" indent="-711281">
-              <a:buClr>
-                <a:srgbClr val="434343"/>
-              </a:buClr>
-              <a:buChar char="●"/>
-            </a:pPr>
-            <a:r>
-              <a:rPr lang="en-US" sz="4002" dirty="0">
-                <a:solidFill>
-                  <a:srgbClr val="434343"/>
-                </a:solidFill>
-              </a:rPr>
-              <a:t>Displaying the steering wheel</a:t>
-            </a:r>
-          </a:p>
-          <a:p>
-            <a:pPr marL="914507" indent="-711281">
-              <a:buClr>
-                <a:srgbClr val="434343"/>
-              </a:buClr>
-              <a:buChar char="●"/>
-            </a:pPr>
-            <a:r>
-              <a:rPr lang="en-US" sz="4002" dirty="0">
-                <a:solidFill>
-                  <a:srgbClr val="434343"/>
-                </a:solidFill>
-              </a:rPr>
-              <a:t>Smoothing out the movement</a:t>
-            </a:r>
-          </a:p>
-          <a:p>
-            <a:pPr marL="914507" indent="-711281">
-              <a:buClr>
-                <a:srgbClr val="434343"/>
-              </a:buClr>
-              <a:buChar char="●"/>
-            </a:pPr>
-            <a:r>
-              <a:rPr lang="en-US" sz="4002" dirty="0">
-                <a:solidFill>
-                  <a:srgbClr val="434343"/>
-                </a:solidFill>
-              </a:rPr>
-              <a:t>Creating a video of this in action</a:t>
-            </a:r>
-          </a:p>
-          <a:p>
-            <a:pPr marL="914507" indent="-711281">
-              <a:buClr>
-                <a:srgbClr val="434343"/>
-              </a:buClr>
-              <a:buChar char="●"/>
-            </a:pPr>
-            <a:endParaRPr lang="en-US" sz="4002" dirty="0">
-              <a:solidFill>
-                <a:srgbClr val="434343"/>
-              </a:solidFill>
-            </a:endParaRPr>
-          </a:p>
-          <a:p>
-            <a:pPr marL="203226" lvl="1">
-              <a:buClr>
-                <a:srgbClr val="434343"/>
-              </a:buClr>
-            </a:pPr>
-            <a:r>
-              <a:rPr lang="en-GB" sz="3200" dirty="0">
-                <a:solidFill>
-                  <a:srgbClr val="434343"/>
-                </a:solidFill>
-                <a:latin typeface="Consolas" panose="020B0609020204030204" pitchFamily="49" charset="0"/>
-                <a:cs typeface="Consolas" panose="020B0609020204030204" pitchFamily="49" charset="0"/>
-              </a:rPr>
-              <a:t>		</a:t>
-            </a:r>
-            <a:endParaRPr lang="en-US" sz="4002" dirty="0">
-              <a:solidFill>
-                <a:srgbClr val="434343"/>
-              </a:solidFill>
-            </a:endParaRPr>
-          </a:p>
-          <a:p>
-            <a:pPr marL="774726" indent="-571500">
-              <a:buClr>
-                <a:srgbClr val="434343"/>
-              </a:buClr>
-              <a:buFont typeface="Arial" panose="020B0604020202020204" pitchFamily="34" charset="0"/>
-              <a:buChar char="•"/>
-            </a:pPr>
-            <a:endParaRPr lang="en" sz="4002" dirty="0">
-              <a:solidFill>
-                <a:srgbClr val="434343"/>
-              </a:solidFill>
-            </a:endParaRPr>
-          </a:p>
-        </p:txBody>
-      </p:sp>
-    </p:spTree>
-    <p:extLst>
-      <p:ext uri="{BB962C8B-B14F-4D97-AF65-F5344CB8AC3E}">
-        <p14:creationId xmlns:p14="http://schemas.microsoft.com/office/powerpoint/2010/main" val="3783544927"/>
       </p:ext>
     </p:extLst>
   </p:cSld>
@@ -8801,6 +9206,273 @@
             <a:pPr algn="ctr"/>
             <a:r>
               <a:rPr lang="en" sz="4402" dirty="0"/>
+              <a:t>Testing Our Model</a:t>
+            </a:r>
+          </a:p>
+        </p:txBody>
+      </p:sp>
+      <p:sp>
+        <p:nvSpPr>
+          <p:cNvPr id="149" name="Shape 149"/>
+          <p:cNvSpPr txBox="1">
+            <a:spLocks noGrp="1"/>
+          </p:cNvSpPr>
+          <p:nvPr>
+            <p:ph type="body" idx="4294967295"/>
+          </p:nvPr>
+        </p:nvSpPr>
+        <p:spPr>
+          <a:xfrm>
+            <a:off x="413459" y="1776131"/>
+            <a:ext cx="17440478" cy="8042873"/>
+          </a:xfrm>
+          <a:prstGeom prst="rect">
+            <a:avLst/>
+          </a:prstGeom>
+        </p:spPr>
+        <p:txBody>
+          <a:bodyPr lIns="182874" tIns="182874" rIns="182874" bIns="182874" anchor="t" anchorCtr="0">
+            <a:noAutofit/>
+          </a:bodyPr>
+          <a:lstStyle/>
+          <a:p>
+            <a:pPr marL="914507" indent="-711281">
+              <a:buClr>
+                <a:srgbClr val="434343"/>
+              </a:buClr>
+              <a:buChar char="●"/>
+            </a:pPr>
+            <a:r>
+              <a:rPr lang="en-US" sz="4002" dirty="0">
+                <a:solidFill>
+                  <a:srgbClr val="434343"/>
+                </a:solidFill>
+              </a:rPr>
+              <a:t>Testing model accuracy</a:t>
+            </a:r>
+          </a:p>
+          <a:p>
+            <a:pPr marL="914507" indent="-711281">
+              <a:buClr>
+                <a:srgbClr val="434343"/>
+              </a:buClr>
+              <a:buChar char="●"/>
+            </a:pPr>
+            <a:r>
+              <a:rPr lang="en-US" sz="4002" dirty="0">
+                <a:solidFill>
+                  <a:srgbClr val="434343"/>
+                </a:solidFill>
+              </a:rPr>
+              <a:t>Displaying the steering wheel</a:t>
+            </a:r>
+          </a:p>
+          <a:p>
+            <a:pPr marL="914507" indent="-711281">
+              <a:buClr>
+                <a:srgbClr val="434343"/>
+              </a:buClr>
+              <a:buChar char="●"/>
+            </a:pPr>
+            <a:r>
+              <a:rPr lang="en-US" sz="4002" dirty="0">
+                <a:solidFill>
+                  <a:srgbClr val="434343"/>
+                </a:solidFill>
+              </a:rPr>
+              <a:t>Smoothing out the movement</a:t>
+            </a:r>
+          </a:p>
+          <a:p>
+            <a:pPr marL="914507" indent="-711281">
+              <a:buClr>
+                <a:srgbClr val="434343"/>
+              </a:buClr>
+              <a:buChar char="●"/>
+            </a:pPr>
+            <a:r>
+              <a:rPr lang="en-US" sz="4002" dirty="0">
+                <a:solidFill>
+                  <a:srgbClr val="434343"/>
+                </a:solidFill>
+              </a:rPr>
+              <a:t>Creating a video of this in action</a:t>
+            </a:r>
+          </a:p>
+          <a:p>
+            <a:pPr marL="914507" indent="-711281">
+              <a:buClr>
+                <a:srgbClr val="434343"/>
+              </a:buClr>
+              <a:buChar char="●"/>
+            </a:pPr>
+            <a:endParaRPr lang="en-US" sz="4002" dirty="0">
+              <a:solidFill>
+                <a:srgbClr val="434343"/>
+              </a:solidFill>
+            </a:endParaRPr>
+          </a:p>
+          <a:p>
+            <a:pPr marL="203226" lvl="1">
+              <a:buClr>
+                <a:srgbClr val="434343"/>
+              </a:buClr>
+            </a:pPr>
+            <a:r>
+              <a:rPr lang="en-GB" sz="3200" dirty="0">
+                <a:solidFill>
+                  <a:srgbClr val="434343"/>
+                </a:solidFill>
+                <a:latin typeface="Consolas" panose="020B0609020204030204" pitchFamily="49" charset="0"/>
+                <a:cs typeface="Consolas" panose="020B0609020204030204" pitchFamily="49" charset="0"/>
+              </a:rPr>
+              <a:t>		</a:t>
+            </a:r>
+            <a:endParaRPr lang="en-US" sz="4002" dirty="0">
+              <a:solidFill>
+                <a:srgbClr val="434343"/>
+              </a:solidFill>
+            </a:endParaRPr>
+          </a:p>
+          <a:p>
+            <a:pPr marL="774726" indent="-571500">
+              <a:buClr>
+                <a:srgbClr val="434343"/>
+              </a:buClr>
+              <a:buFont typeface="Arial" panose="020B0604020202020204" pitchFamily="34" charset="0"/>
+              <a:buChar char="•"/>
+            </a:pPr>
+            <a:endParaRPr lang="en" sz="4002" dirty="0">
+              <a:solidFill>
+                <a:srgbClr val="434343"/>
+              </a:solidFill>
+            </a:endParaRPr>
+          </a:p>
+        </p:txBody>
+      </p:sp>
+    </p:spTree>
+    <p:extLst>
+      <p:ext uri="{BB962C8B-B14F-4D97-AF65-F5344CB8AC3E}">
+        <p14:creationId xmlns:p14="http://schemas.microsoft.com/office/powerpoint/2010/main" val="3783544927"/>
+      </p:ext>
+    </p:extLst>
+  </p:cSld>
+  <p:clrMapOvr>
+    <a:masterClrMapping/>
+  </p:clrMapOvr>
+</p:sld>
+</file>
+
+<file path=ppt/slides/slide24.xml><?xml version="1.0" encoding="utf-8"?>
+<p:sld xmlns:a="http://schemas.openxmlformats.org/drawingml/2006/main" xmlns:r="http://schemas.openxmlformats.org/officeDocument/2006/relationships" xmlns:p="http://schemas.openxmlformats.org/presentationml/2006/main">
+  <p:cSld>
+    <p:spTree>
+      <p:nvGrpSpPr>
+        <p:cNvPr id="1" name="Shape 172"/>
+        <p:cNvGrpSpPr/>
+        <p:nvPr/>
+      </p:nvGrpSpPr>
+      <p:grpSpPr>
+        <a:xfrm>
+          <a:off x="0" y="0"/>
+          <a:ext cx="0" cy="0"/>
+          <a:chOff x="0" y="0"/>
+          <a:chExt cx="0" cy="0"/>
+        </a:xfrm>
+      </p:grpSpPr>
+      <p:sp>
+        <p:nvSpPr>
+          <p:cNvPr id="173" name="Shape 173"/>
+          <p:cNvSpPr txBox="1">
+            <a:spLocks noGrp="1"/>
+          </p:cNvSpPr>
+          <p:nvPr>
+            <p:ph type="title"/>
+          </p:nvPr>
+        </p:nvSpPr>
+        <p:spPr>
+          <a:xfrm>
+            <a:off x="976721" y="976049"/>
+            <a:ext cx="16075446" cy="8177813"/>
+          </a:xfrm>
+          <a:prstGeom prst="rect">
+            <a:avLst/>
+          </a:prstGeom>
+        </p:spPr>
+        <p:txBody>
+          <a:bodyPr lIns="182874" tIns="182874" rIns="182874" bIns="182874" anchor="ctr" anchorCtr="0">
+            <a:noAutofit/>
+          </a:bodyPr>
+          <a:lstStyle/>
+          <a:p>
+            <a:r>
+              <a:rPr lang="en" dirty="0">
+                <a:latin typeface="Consolas" panose="020B0609020204030204" pitchFamily="49" charset="0"/>
+                <a:cs typeface="Consolas" panose="020B0609020204030204" pitchFamily="49" charset="0"/>
+              </a:rPr>
+              <a:t>Let’s explore the code…</a:t>
+            </a:r>
+          </a:p>
+        </p:txBody>
+      </p:sp>
+    </p:spTree>
+    <p:extLst>
+      <p:ext uri="{BB962C8B-B14F-4D97-AF65-F5344CB8AC3E}">
+        <p14:creationId xmlns:p14="http://schemas.microsoft.com/office/powerpoint/2010/main" val="2664113388"/>
+      </p:ext>
+    </p:extLst>
+  </p:cSld>
+  <p:clrMapOvr>
+    <a:masterClrMapping/>
+  </p:clrMapOvr>
+</p:sld>
+</file>
+
+<file path=ppt/slides/slide25.xml><?xml version="1.0" encoding="utf-8"?>
+<p:sld xmlns:a="http://schemas.openxmlformats.org/drawingml/2006/main" xmlns:r="http://schemas.openxmlformats.org/officeDocument/2006/relationships" xmlns:p="http://schemas.openxmlformats.org/presentationml/2006/main">
+  <p:cSld>
+    <p:spTree>
+      <p:nvGrpSpPr>
+        <p:cNvPr id="1" name="Shape 147"/>
+        <p:cNvGrpSpPr/>
+        <p:nvPr/>
+      </p:nvGrpSpPr>
+      <p:grpSpPr>
+        <a:xfrm>
+          <a:off x="0" y="0"/>
+          <a:ext cx="0" cy="0"/>
+          <a:chOff x="0" y="0"/>
+          <a:chExt cx="0" cy="0"/>
+        </a:xfrm>
+      </p:grpSpPr>
+      <p:sp>
+        <p:nvSpPr>
+          <p:cNvPr id="148" name="Shape 148"/>
+          <p:cNvSpPr txBox="1">
+            <a:spLocks noGrp="1"/>
+          </p:cNvSpPr>
+          <p:nvPr>
+            <p:ph type="title"/>
+          </p:nvPr>
+        </p:nvSpPr>
+        <p:spPr>
+          <a:xfrm>
+            <a:off x="192358" y="32689"/>
+            <a:ext cx="17661379" cy="1204842"/>
+          </a:xfrm>
+          <a:prstGeom prst="rect">
+            <a:avLst/>
+          </a:prstGeom>
+        </p:spPr>
+        <p:txBody>
+          <a:bodyPr lIns="182874" tIns="182874" rIns="182874" bIns="182874" anchor="ctr" anchorCtr="0">
+            <a:noAutofit/>
+          </a:bodyPr>
+          <a:lstStyle/>
+          <a:p>
+            <a:pPr algn="ctr"/>
+            <a:r>
+              <a:rPr lang="en" sz="4402" dirty="0"/>
               <a:t>How to make it better?</a:t>
             </a:r>
           </a:p>
@@ -8942,7 +9614,7 @@
 </p:sld>
 </file>
 
-<file path=ppt/slides/slide24.xml><?xml version="1.0" encoding="utf-8"?>
+<file path=ppt/slides/slide26.xml><?xml version="1.0" encoding="utf-8"?>
 <p:sld xmlns:a="http://schemas.openxmlformats.org/drawingml/2006/main" xmlns:r="http://schemas.openxmlformats.org/officeDocument/2006/relationships" xmlns:p="http://schemas.openxmlformats.org/presentationml/2006/main">
   <p:cSld>
     <p:bg>
@@ -9445,14 +10117,11 @@
               </a:buClr>
               <a:buChar char="●"/>
             </a:pPr>
-            <a:r>
-              <a:rPr lang="en-US" sz="4002" dirty="0">
-                <a:solidFill>
-                  <a:srgbClr val="434343"/>
-                </a:solidFill>
-              </a:rPr>
-              <a:t>How… </a:t>
-            </a:r>
+            <a:endParaRPr lang="en-US" sz="4002" dirty="0">
+              <a:solidFill>
+                <a:srgbClr val="434343"/>
+              </a:solidFill>
+            </a:endParaRPr>
           </a:p>
           <a:p>
             <a:pPr marL="914507" indent="-711281">

</xml_diff>